<commit_message>
Updates + Added HOPE 2016
Updated an old slide deck, and added the TSA Keys deck from HOPE XI
</commit_message>
<xml_diff>
--- a/2015/1993 BC Series/GET OFF MY LAN/1993 BC - Get Off My LAN (Hacking in the 90s)(FULL).pptx
+++ b/2015/1993 BC Series/GET OFF MY LAN/1993 BC - Get Off My LAN (Hacking in the 90s)(FULL).pptx
@@ -9,8 +9,8 @@
   </p:notesMasterIdLst>
   <p:sldIdLst>
     <p:sldId id="256" r:id="rId2"/>
-    <p:sldId id="282" r:id="rId3"/>
-    <p:sldId id="279" r:id="rId4"/>
+    <p:sldId id="279" r:id="rId3"/>
+    <p:sldId id="285" r:id="rId4"/>
     <p:sldId id="284" r:id="rId5"/>
     <p:sldId id="257" r:id="rId6"/>
     <p:sldId id="258" r:id="rId7"/>
@@ -235,7 +235,7 @@
           <a:p>
             <a:fld id="{00ABBFD6-C9A5-654E-8C39-FF0D5DFD86C3}" type="datetimeFigureOut">
               <a:rPr lang="en-US" smtClean="0"/>
-              <a:t>11/7/15</a:t>
+              <a:t>7/20/16</a:t>
             </a:fld>
             <a:endParaRPr lang="en-US"/>
           </a:p>
@@ -633,11 +633,7 @@
           <a:p>
             <a:r>
               <a:rPr lang="en-US" dirty="0" smtClean="0"/>
-              <a:t>RFC</a:t>
-            </a:r>
-            <a:r>
-              <a:rPr lang="en-US" baseline="0" dirty="0" smtClean="0"/>
-              <a:t> Definition of Cracker in the Internet Glossary </a:t>
+              <a:t>BBS Documentary by Jason Scott</a:t>
             </a:r>
             <a:endParaRPr lang="en-US" dirty="0"/>
           </a:p>
@@ -660,7 +656,7 @@
           <a:p>
             <a:fld id="{9C98F037-C6EA-954E-A8AB-2225B8BC60C0}" type="slidenum">
               <a:rPr lang="en-US" smtClean="0"/>
-              <a:t>20</a:t>
+              <a:t>11</a:t>
             </a:fld>
             <a:endParaRPr lang="en-US"/>
           </a:p>
@@ -669,7 +665,7 @@
     </p:spTree>
     <p:extLst>
       <p:ext uri="{BB962C8B-B14F-4D97-AF65-F5344CB8AC3E}">
-        <p14:creationId xmlns:p14="http://schemas.microsoft.com/office/powerpoint/2010/main" val="3638065956"/>
+        <p14:creationId xmlns:p14="http://schemas.microsoft.com/office/powerpoint/2010/main" val="1183241388"/>
       </p:ext>
     </p:extLst>
   </p:cSld>
@@ -723,31 +719,61 @@
           <a:bodyPr/>
           <a:lstStyle/>
           <a:p>
-            <a:pPr marL="0" marR="0" indent="0" algn="l" defTabSz="457200" rtl="0" eaLnBrk="1" fontAlgn="auto" latinLnBrk="0" hangingPunct="1">
-              <a:lnSpc>
-                <a:spcPct val="100000"/>
-              </a:lnSpc>
-              <a:spcBef>
-                <a:spcPts val="0"/>
-              </a:spcBef>
-              <a:spcAft>
-                <a:spcPts val="0"/>
-              </a:spcAft>
-              <a:buClrTx/>
-              <a:buSzTx/>
-              <a:buFontTx/>
-              <a:buNone/>
-              <a:tabLst/>
-              <a:defRPr/>
-            </a:pPr>
-            <a:r>
-              <a:rPr lang="en-US" dirty="0" smtClean="0"/>
-              <a:t>Those who cannot remember the past are condemned to repeat</a:t>
+            <a:r>
+              <a:rPr lang="en-US" dirty="0" smtClean="0"/>
+              <a:t>Sometimes</a:t>
             </a:r>
             <a:r>
               <a:rPr lang="en-US" baseline="0" dirty="0" smtClean="0"/>
-              <a:t> it – George Santayana, Spanish philosopher </a:t>
-            </a:r>
+              <a:t> got you network equipment. Rarely an application server.</a:t>
+            </a:r>
+          </a:p>
+          <a:p>
+            <a:endParaRPr lang="en-US" baseline="0" dirty="0" smtClean="0"/>
+          </a:p>
+          <a:p>
+            <a:r>
+              <a:rPr lang="en-US" baseline="0" dirty="0" smtClean="0"/>
+              <a:t>414s – Milwaukee-based hackers, the original </a:t>
+            </a:r>
+            <a:r>
+              <a:rPr lang="en-US" baseline="0" dirty="0" err="1" smtClean="0"/>
+              <a:t>Lulzsec</a:t>
+            </a:r>
+            <a:r>
+              <a:rPr lang="en-US" baseline="0" dirty="0" smtClean="0"/>
+              <a:t>. Broke into </a:t>
+            </a:r>
+            <a:r>
+              <a:rPr lang="en-US" baseline="0" dirty="0" err="1" smtClean="0"/>
+              <a:t>compnies</a:t>
+            </a:r>
+            <a:r>
+              <a:rPr lang="en-US" baseline="0" dirty="0" smtClean="0"/>
+              <a:t> via </a:t>
+            </a:r>
+            <a:r>
+              <a:rPr lang="en-US" baseline="0" dirty="0" err="1" smtClean="0"/>
+              <a:t>wardialing</a:t>
+            </a:r>
+            <a:r>
+              <a:rPr lang="en-US" baseline="0" dirty="0" smtClean="0"/>
+              <a:t> &amp; default passwords, or via well-known security exploits. Leader got onto the cover of </a:t>
+            </a:r>
+            <a:r>
+              <a:rPr lang="en-US" baseline="0" dirty="0" err="1" smtClean="0"/>
+              <a:t>newsweek</a:t>
+            </a:r>
+            <a:r>
+              <a:rPr lang="en-US" baseline="0" dirty="0" smtClean="0"/>
+              <a:t> for these simple hacks. </a:t>
+            </a:r>
+            <a:endParaRPr lang="en-US" baseline="0" dirty="0" smtClean="0"/>
+          </a:p>
+          <a:p>
+            <a:endParaRPr lang="en-US" baseline="0" dirty="0" smtClean="0"/>
+          </a:p>
+          <a:p>
             <a:endParaRPr lang="en-US" dirty="0"/>
           </a:p>
         </p:txBody>
@@ -769,7 +795,7 @@
           <a:p>
             <a:fld id="{9C98F037-C6EA-954E-A8AB-2225B8BC60C0}" type="slidenum">
               <a:rPr lang="en-US" smtClean="0"/>
-              <a:t>23</a:t>
+              <a:t>13</a:t>
             </a:fld>
             <a:endParaRPr lang="en-US"/>
           </a:p>
@@ -778,7 +804,7 @@
     </p:spTree>
     <p:extLst>
       <p:ext uri="{BB962C8B-B14F-4D97-AF65-F5344CB8AC3E}">
-        <p14:creationId xmlns:p14="http://schemas.microsoft.com/office/powerpoint/2010/main" val="2602477998"/>
+        <p14:creationId xmlns:p14="http://schemas.microsoft.com/office/powerpoint/2010/main" val="2747697426"/>
       </p:ext>
     </p:extLst>
   </p:cSld>
@@ -834,23 +860,7 @@
           <a:p>
             <a:r>
               <a:rPr lang="en-US" dirty="0" smtClean="0"/>
-              <a:t>Apple’s famous </a:t>
-            </a:r>
-            <a:r>
-              <a:rPr lang="en-US" dirty="0" err="1" smtClean="0"/>
-              <a:t>iOS</a:t>
-            </a:r>
-            <a:r>
-              <a:rPr lang="en-US" dirty="0" smtClean="0"/>
-              <a:t> </a:t>
-            </a:r>
-            <a:r>
-              <a:rPr lang="en-US" dirty="0" err="1" smtClean="0"/>
-              <a:t>lockscreen</a:t>
-            </a:r>
-            <a:r>
-              <a:rPr lang="en-US" baseline="0" dirty="0" smtClean="0"/>
-              <a:t> bypass</a:t>
+              <a:t>Extortion</a:t>
             </a:r>
             <a:endParaRPr lang="en-US" dirty="0"/>
           </a:p>
@@ -873,7 +883,7 @@
           <a:p>
             <a:fld id="{9C98F037-C6EA-954E-A8AB-2225B8BC60C0}" type="slidenum">
               <a:rPr lang="en-US" smtClean="0"/>
-              <a:t>24</a:t>
+              <a:t>17</a:t>
             </a:fld>
             <a:endParaRPr lang="en-US"/>
           </a:p>
@@ -882,7 +892,7 @@
     </p:spTree>
     <p:extLst>
       <p:ext uri="{BB962C8B-B14F-4D97-AF65-F5344CB8AC3E}">
-        <p14:creationId xmlns:p14="http://schemas.microsoft.com/office/powerpoint/2010/main" val="958312307"/>
+        <p14:creationId xmlns:p14="http://schemas.microsoft.com/office/powerpoint/2010/main" val="1644058500"/>
       </p:ext>
     </p:extLst>
   </p:cSld>
@@ -936,6 +946,203 @@
           <a:bodyPr/>
           <a:lstStyle/>
           <a:p>
+            <a:r>
+              <a:rPr lang="en-US" dirty="0" smtClean="0"/>
+              <a:t>Order stuff and have it shipped</a:t>
+            </a:r>
+            <a:r>
+              <a:rPr lang="en-US" baseline="0" dirty="0" smtClean="0"/>
+              <a:t> to your local abandoned house</a:t>
+            </a:r>
+            <a:endParaRPr lang="en-US" dirty="0"/>
+          </a:p>
+        </p:txBody>
+      </p:sp>
+      <p:sp>
+        <p:nvSpPr>
+          <p:cNvPr id="4" name="Slide Number Placeholder 3"/>
+          <p:cNvSpPr>
+            <a:spLocks noGrp="1"/>
+          </p:cNvSpPr>
+          <p:nvPr>
+            <p:ph type="sldNum" sz="quarter" idx="10"/>
+          </p:nvPr>
+        </p:nvSpPr>
+        <p:spPr/>
+        <p:txBody>
+          <a:bodyPr/>
+          <a:lstStyle/>
+          <a:p>
+            <a:fld id="{9C98F037-C6EA-954E-A8AB-2225B8BC60C0}" type="slidenum">
+              <a:rPr lang="en-US" smtClean="0"/>
+              <a:t>19</a:t>
+            </a:fld>
+            <a:endParaRPr lang="en-US"/>
+          </a:p>
+        </p:txBody>
+      </p:sp>
+    </p:spTree>
+    <p:extLst>
+      <p:ext uri="{BB962C8B-B14F-4D97-AF65-F5344CB8AC3E}">
+        <p14:creationId xmlns:p14="http://schemas.microsoft.com/office/powerpoint/2010/main" val="1510660372"/>
+      </p:ext>
+    </p:extLst>
+  </p:cSld>
+  <p:clrMapOvr>
+    <a:masterClrMapping/>
+  </p:clrMapOvr>
+</p:notes>
+</file>
+
+<file path=ppt/notesSlides/notesSlide14.xml><?xml version="1.0" encoding="utf-8"?>
+<p:notes xmlns:a="http://schemas.openxmlformats.org/drawingml/2006/main" xmlns:r="http://schemas.openxmlformats.org/officeDocument/2006/relationships" xmlns:p="http://schemas.openxmlformats.org/presentationml/2006/main">
+  <p:cSld>
+    <p:spTree>
+      <p:nvGrpSpPr>
+        <p:cNvPr id="1" name=""/>
+        <p:cNvGrpSpPr/>
+        <p:nvPr/>
+      </p:nvGrpSpPr>
+      <p:grpSpPr>
+        <a:xfrm>
+          <a:off x="0" y="0"/>
+          <a:ext cx="0" cy="0"/>
+          <a:chOff x="0" y="0"/>
+          <a:chExt cx="0" cy="0"/>
+        </a:xfrm>
+      </p:grpSpPr>
+      <p:sp>
+        <p:nvSpPr>
+          <p:cNvPr id="2" name="Slide Image Placeholder 1"/>
+          <p:cNvSpPr>
+            <a:spLocks noGrp="1" noRot="1" noChangeAspect="1"/>
+          </p:cNvSpPr>
+          <p:nvPr>
+            <p:ph type="sldImg"/>
+          </p:nvPr>
+        </p:nvSpPr>
+        <p:spPr/>
+      </p:sp>
+      <p:sp>
+        <p:nvSpPr>
+          <p:cNvPr id="3" name="Notes Placeholder 2"/>
+          <p:cNvSpPr>
+            <a:spLocks noGrp="1"/>
+          </p:cNvSpPr>
+          <p:nvPr>
+            <p:ph type="body" idx="1"/>
+          </p:nvPr>
+        </p:nvSpPr>
+        <p:spPr/>
+        <p:txBody>
+          <a:bodyPr/>
+          <a:lstStyle/>
+          <a:p>
+            <a:r>
+              <a:rPr lang="en-US" dirty="0" smtClean="0"/>
+              <a:t>Rise of internet forums &amp; IRC</a:t>
+            </a:r>
+          </a:p>
+          <a:p>
+            <a:endParaRPr lang="en-US" dirty="0" smtClean="0"/>
+          </a:p>
+          <a:p>
+            <a:r>
+              <a:rPr lang="en-US" dirty="0" smtClean="0"/>
+              <a:t>RFC</a:t>
+            </a:r>
+            <a:r>
+              <a:rPr lang="en-US" baseline="0" dirty="0" smtClean="0"/>
+              <a:t> </a:t>
+            </a:r>
+            <a:r>
+              <a:rPr lang="en-US" baseline="0" dirty="0" smtClean="0"/>
+              <a:t>Definition of Cracker in the Internet Glossary </a:t>
+            </a:r>
+            <a:endParaRPr lang="en-US" dirty="0"/>
+          </a:p>
+        </p:txBody>
+      </p:sp>
+      <p:sp>
+        <p:nvSpPr>
+          <p:cNvPr id="4" name="Slide Number Placeholder 3"/>
+          <p:cNvSpPr>
+            <a:spLocks noGrp="1"/>
+          </p:cNvSpPr>
+          <p:nvPr>
+            <p:ph type="sldNum" sz="quarter" idx="10"/>
+          </p:nvPr>
+        </p:nvSpPr>
+        <p:spPr/>
+        <p:txBody>
+          <a:bodyPr/>
+          <a:lstStyle/>
+          <a:p>
+            <a:fld id="{9C98F037-C6EA-954E-A8AB-2225B8BC60C0}" type="slidenum">
+              <a:rPr lang="en-US" smtClean="0"/>
+              <a:t>20</a:t>
+            </a:fld>
+            <a:endParaRPr lang="en-US"/>
+          </a:p>
+        </p:txBody>
+      </p:sp>
+    </p:spTree>
+    <p:extLst>
+      <p:ext uri="{BB962C8B-B14F-4D97-AF65-F5344CB8AC3E}">
+        <p14:creationId xmlns:p14="http://schemas.microsoft.com/office/powerpoint/2010/main" val="3638065956"/>
+      </p:ext>
+    </p:extLst>
+  </p:cSld>
+  <p:clrMapOvr>
+    <a:masterClrMapping/>
+  </p:clrMapOvr>
+</p:notes>
+</file>
+
+<file path=ppt/notesSlides/notesSlide15.xml><?xml version="1.0" encoding="utf-8"?>
+<p:notes xmlns:a="http://schemas.openxmlformats.org/drawingml/2006/main" xmlns:r="http://schemas.openxmlformats.org/officeDocument/2006/relationships" xmlns:p="http://schemas.openxmlformats.org/presentationml/2006/main">
+  <p:cSld>
+    <p:spTree>
+      <p:nvGrpSpPr>
+        <p:cNvPr id="1" name=""/>
+        <p:cNvGrpSpPr/>
+        <p:nvPr/>
+      </p:nvGrpSpPr>
+      <p:grpSpPr>
+        <a:xfrm>
+          <a:off x="0" y="0"/>
+          <a:ext cx="0" cy="0"/>
+          <a:chOff x="0" y="0"/>
+          <a:chExt cx="0" cy="0"/>
+        </a:xfrm>
+      </p:grpSpPr>
+      <p:sp>
+        <p:nvSpPr>
+          <p:cNvPr id="2" name="Slide Image Placeholder 1"/>
+          <p:cNvSpPr>
+            <a:spLocks noGrp="1" noRot="1" noChangeAspect="1"/>
+          </p:cNvSpPr>
+          <p:nvPr>
+            <p:ph type="sldImg"/>
+          </p:nvPr>
+        </p:nvSpPr>
+        <p:spPr/>
+      </p:sp>
+      <p:sp>
+        <p:nvSpPr>
+          <p:cNvPr id="3" name="Notes Placeholder 2"/>
+          <p:cNvSpPr>
+            <a:spLocks noGrp="1"/>
+          </p:cNvSpPr>
+          <p:nvPr>
+            <p:ph type="body" idx="1"/>
+          </p:nvPr>
+        </p:nvSpPr>
+        <p:spPr/>
+        <p:txBody>
+          <a:bodyPr/>
+          <a:lstStyle/>
+          <a:p>
             <a:pPr marL="0" marR="0" indent="0" algn="l" defTabSz="457200" rtl="0" eaLnBrk="1" fontAlgn="auto" latinLnBrk="0" hangingPunct="1">
               <a:lnSpc>
                 <a:spcPct val="100000"/>
@@ -955,6 +1162,219 @@
             </a:pPr>
             <a:r>
               <a:rPr lang="en-US" dirty="0" smtClean="0"/>
+              <a:t>Those who cannot remember the past are condemned to repeat</a:t>
+            </a:r>
+            <a:r>
+              <a:rPr lang="en-US" baseline="0" dirty="0" smtClean="0"/>
+              <a:t> it – George Santayana, Spanish philosopher </a:t>
+            </a:r>
+            <a:endParaRPr lang="en-US" dirty="0"/>
+          </a:p>
+        </p:txBody>
+      </p:sp>
+      <p:sp>
+        <p:nvSpPr>
+          <p:cNvPr id="4" name="Slide Number Placeholder 3"/>
+          <p:cNvSpPr>
+            <a:spLocks noGrp="1"/>
+          </p:cNvSpPr>
+          <p:nvPr>
+            <p:ph type="sldNum" sz="quarter" idx="10"/>
+          </p:nvPr>
+        </p:nvSpPr>
+        <p:spPr/>
+        <p:txBody>
+          <a:bodyPr/>
+          <a:lstStyle/>
+          <a:p>
+            <a:fld id="{9C98F037-C6EA-954E-A8AB-2225B8BC60C0}" type="slidenum">
+              <a:rPr lang="en-US" smtClean="0"/>
+              <a:t>23</a:t>
+            </a:fld>
+            <a:endParaRPr lang="en-US"/>
+          </a:p>
+        </p:txBody>
+      </p:sp>
+    </p:spTree>
+    <p:extLst>
+      <p:ext uri="{BB962C8B-B14F-4D97-AF65-F5344CB8AC3E}">
+        <p14:creationId xmlns:p14="http://schemas.microsoft.com/office/powerpoint/2010/main" val="2602477998"/>
+      </p:ext>
+    </p:extLst>
+  </p:cSld>
+  <p:clrMapOvr>
+    <a:masterClrMapping/>
+  </p:clrMapOvr>
+</p:notes>
+</file>
+
+<file path=ppt/notesSlides/notesSlide16.xml><?xml version="1.0" encoding="utf-8"?>
+<p:notes xmlns:a="http://schemas.openxmlformats.org/drawingml/2006/main" xmlns:r="http://schemas.openxmlformats.org/officeDocument/2006/relationships" xmlns:p="http://schemas.openxmlformats.org/presentationml/2006/main">
+  <p:cSld>
+    <p:spTree>
+      <p:nvGrpSpPr>
+        <p:cNvPr id="1" name=""/>
+        <p:cNvGrpSpPr/>
+        <p:nvPr/>
+      </p:nvGrpSpPr>
+      <p:grpSpPr>
+        <a:xfrm>
+          <a:off x="0" y="0"/>
+          <a:ext cx="0" cy="0"/>
+          <a:chOff x="0" y="0"/>
+          <a:chExt cx="0" cy="0"/>
+        </a:xfrm>
+      </p:grpSpPr>
+      <p:sp>
+        <p:nvSpPr>
+          <p:cNvPr id="2" name="Slide Image Placeholder 1"/>
+          <p:cNvSpPr>
+            <a:spLocks noGrp="1" noRot="1" noChangeAspect="1"/>
+          </p:cNvSpPr>
+          <p:nvPr>
+            <p:ph type="sldImg"/>
+          </p:nvPr>
+        </p:nvSpPr>
+        <p:spPr/>
+      </p:sp>
+      <p:sp>
+        <p:nvSpPr>
+          <p:cNvPr id="3" name="Notes Placeholder 2"/>
+          <p:cNvSpPr>
+            <a:spLocks noGrp="1"/>
+          </p:cNvSpPr>
+          <p:nvPr>
+            <p:ph type="body" idx="1"/>
+          </p:nvPr>
+        </p:nvSpPr>
+        <p:spPr/>
+        <p:txBody>
+          <a:bodyPr/>
+          <a:lstStyle/>
+          <a:p>
+            <a:r>
+              <a:rPr lang="en-US" dirty="0" smtClean="0"/>
+              <a:t>Apple’s famous </a:t>
+            </a:r>
+            <a:r>
+              <a:rPr lang="en-US" dirty="0" err="1" smtClean="0"/>
+              <a:t>iOS</a:t>
+            </a:r>
+            <a:r>
+              <a:rPr lang="en-US" dirty="0" smtClean="0"/>
+              <a:t> </a:t>
+            </a:r>
+            <a:r>
+              <a:rPr lang="en-US" dirty="0" err="1" smtClean="0"/>
+              <a:t>lockscreen</a:t>
+            </a:r>
+            <a:r>
+              <a:rPr lang="en-US" baseline="0" dirty="0" smtClean="0"/>
+              <a:t> bypass</a:t>
+            </a:r>
+            <a:endParaRPr lang="en-US" dirty="0"/>
+          </a:p>
+        </p:txBody>
+      </p:sp>
+      <p:sp>
+        <p:nvSpPr>
+          <p:cNvPr id="4" name="Slide Number Placeholder 3"/>
+          <p:cNvSpPr>
+            <a:spLocks noGrp="1"/>
+          </p:cNvSpPr>
+          <p:nvPr>
+            <p:ph type="sldNum" sz="quarter" idx="10"/>
+          </p:nvPr>
+        </p:nvSpPr>
+        <p:spPr/>
+        <p:txBody>
+          <a:bodyPr/>
+          <a:lstStyle/>
+          <a:p>
+            <a:fld id="{9C98F037-C6EA-954E-A8AB-2225B8BC60C0}" type="slidenum">
+              <a:rPr lang="en-US" smtClean="0"/>
+              <a:t>24</a:t>
+            </a:fld>
+            <a:endParaRPr lang="en-US"/>
+          </a:p>
+        </p:txBody>
+      </p:sp>
+    </p:spTree>
+    <p:extLst>
+      <p:ext uri="{BB962C8B-B14F-4D97-AF65-F5344CB8AC3E}">
+        <p14:creationId xmlns:p14="http://schemas.microsoft.com/office/powerpoint/2010/main" val="958312307"/>
+      </p:ext>
+    </p:extLst>
+  </p:cSld>
+  <p:clrMapOvr>
+    <a:masterClrMapping/>
+  </p:clrMapOvr>
+</p:notes>
+</file>
+
+<file path=ppt/notesSlides/notesSlide17.xml><?xml version="1.0" encoding="utf-8"?>
+<p:notes xmlns:a="http://schemas.openxmlformats.org/drawingml/2006/main" xmlns:r="http://schemas.openxmlformats.org/officeDocument/2006/relationships" xmlns:p="http://schemas.openxmlformats.org/presentationml/2006/main">
+  <p:cSld>
+    <p:spTree>
+      <p:nvGrpSpPr>
+        <p:cNvPr id="1" name=""/>
+        <p:cNvGrpSpPr/>
+        <p:nvPr/>
+      </p:nvGrpSpPr>
+      <p:grpSpPr>
+        <a:xfrm>
+          <a:off x="0" y="0"/>
+          <a:ext cx="0" cy="0"/>
+          <a:chOff x="0" y="0"/>
+          <a:chExt cx="0" cy="0"/>
+        </a:xfrm>
+      </p:grpSpPr>
+      <p:sp>
+        <p:nvSpPr>
+          <p:cNvPr id="2" name="Slide Image Placeholder 1"/>
+          <p:cNvSpPr>
+            <a:spLocks noGrp="1" noRot="1" noChangeAspect="1"/>
+          </p:cNvSpPr>
+          <p:nvPr>
+            <p:ph type="sldImg"/>
+          </p:nvPr>
+        </p:nvSpPr>
+        <p:spPr/>
+      </p:sp>
+      <p:sp>
+        <p:nvSpPr>
+          <p:cNvPr id="3" name="Notes Placeholder 2"/>
+          <p:cNvSpPr>
+            <a:spLocks noGrp="1"/>
+          </p:cNvSpPr>
+          <p:nvPr>
+            <p:ph type="body" idx="1"/>
+          </p:nvPr>
+        </p:nvSpPr>
+        <p:spPr/>
+        <p:txBody>
+          <a:bodyPr/>
+          <a:lstStyle/>
+          <a:p>
+            <a:pPr marL="0" marR="0" indent="0" algn="l" defTabSz="457200" rtl="0" eaLnBrk="1" fontAlgn="auto" latinLnBrk="0" hangingPunct="1">
+              <a:lnSpc>
+                <a:spcPct val="100000"/>
+              </a:lnSpc>
+              <a:spcBef>
+                <a:spcPts val="0"/>
+              </a:spcBef>
+              <a:spcAft>
+                <a:spcPts val="0"/>
+              </a:spcAft>
+              <a:buClrTx/>
+              <a:buSzTx/>
+              <a:buFontTx/>
+              <a:buNone/>
+              <a:tabLst/>
+              <a:defRPr/>
+            </a:pPr>
+            <a:r>
+              <a:rPr lang="en-US" dirty="0" smtClean="0"/>
               <a:t>Discuss </a:t>
             </a:r>
             <a:r>
@@ -967,8 +1387,31 @@
             </a:r>
             <a:r>
               <a:rPr lang="en-US" baseline="0" dirty="0" smtClean="0"/>
-              <a:t> you would get PW dumps, but rarely find anything great (talk about this later)</a:t>
-            </a:r>
+              <a:t> you would get PW dumps, but rarely find anything great (talk about this later</a:t>
+            </a:r>
+            <a:r>
+              <a:rPr lang="en-US" baseline="0" dirty="0" smtClean="0"/>
+              <a:t>)</a:t>
+            </a:r>
+          </a:p>
+          <a:p>
+            <a:pPr marL="0" marR="0" indent="0" algn="l" defTabSz="457200" rtl="0" eaLnBrk="1" fontAlgn="auto" latinLnBrk="0" hangingPunct="1">
+              <a:lnSpc>
+                <a:spcPct val="100000"/>
+              </a:lnSpc>
+              <a:spcBef>
+                <a:spcPts val="0"/>
+              </a:spcBef>
+              <a:spcAft>
+                <a:spcPts val="0"/>
+              </a:spcAft>
+              <a:buClrTx/>
+              <a:buSzTx/>
+              <a:buFontTx/>
+              <a:buNone/>
+              <a:tabLst/>
+              <a:defRPr/>
+            </a:pPr>
             <a:endParaRPr lang="en-US" dirty="0" smtClean="0"/>
           </a:p>
           <a:p>
@@ -980,6 +1423,9 @@
               <a:rPr lang="en-US" dirty="0" err="1" smtClean="0"/>
               <a:t>Livejournal</a:t>
             </a:r>
+            <a:endParaRPr lang="en-US" dirty="0" smtClean="0"/>
+          </a:p>
+          <a:p>
             <a:endParaRPr lang="en-US" dirty="0" smtClean="0"/>
           </a:p>
           <a:p>
@@ -1026,6 +1472,182 @@
     <p:extLst>
       <p:ext uri="{BB962C8B-B14F-4D97-AF65-F5344CB8AC3E}">
         <p14:creationId xmlns:p14="http://schemas.microsoft.com/office/powerpoint/2010/main" val="3936752507"/>
+      </p:ext>
+    </p:extLst>
+  </p:cSld>
+  <p:clrMapOvr>
+    <a:masterClrMapping/>
+  </p:clrMapOvr>
+</p:notes>
+</file>
+
+<file path=ppt/notesSlides/notesSlide18.xml><?xml version="1.0" encoding="utf-8"?>
+<p:notes xmlns:a="http://schemas.openxmlformats.org/drawingml/2006/main" xmlns:r="http://schemas.openxmlformats.org/officeDocument/2006/relationships" xmlns:p="http://schemas.openxmlformats.org/presentationml/2006/main">
+  <p:cSld>
+    <p:spTree>
+      <p:nvGrpSpPr>
+        <p:cNvPr id="1" name=""/>
+        <p:cNvGrpSpPr/>
+        <p:nvPr/>
+      </p:nvGrpSpPr>
+      <p:grpSpPr>
+        <a:xfrm>
+          <a:off x="0" y="0"/>
+          <a:ext cx="0" cy="0"/>
+          <a:chOff x="0" y="0"/>
+          <a:chExt cx="0" cy="0"/>
+        </a:xfrm>
+      </p:grpSpPr>
+      <p:sp>
+        <p:nvSpPr>
+          <p:cNvPr id="2" name="Slide Image Placeholder 1"/>
+          <p:cNvSpPr>
+            <a:spLocks noGrp="1" noRot="1" noChangeAspect="1"/>
+          </p:cNvSpPr>
+          <p:nvPr>
+            <p:ph type="sldImg"/>
+          </p:nvPr>
+        </p:nvSpPr>
+        <p:spPr/>
+      </p:sp>
+      <p:sp>
+        <p:nvSpPr>
+          <p:cNvPr id="3" name="Notes Placeholder 2"/>
+          <p:cNvSpPr>
+            <a:spLocks noGrp="1"/>
+          </p:cNvSpPr>
+          <p:nvPr>
+            <p:ph type="body" idx="1"/>
+          </p:nvPr>
+        </p:nvSpPr>
+        <p:spPr/>
+        <p:txBody>
+          <a:bodyPr/>
+          <a:lstStyle/>
+          <a:p>
+            <a:r>
+              <a:rPr lang="en-US" dirty="0" smtClean="0"/>
+              <a:t>Security</a:t>
+            </a:r>
+            <a:r>
+              <a:rPr lang="en-US" baseline="0" dirty="0" smtClean="0"/>
+              <a:t> check is often done after product ships</a:t>
+            </a:r>
+            <a:endParaRPr lang="en-US" dirty="0"/>
+          </a:p>
+        </p:txBody>
+      </p:sp>
+      <p:sp>
+        <p:nvSpPr>
+          <p:cNvPr id="4" name="Slide Number Placeholder 3"/>
+          <p:cNvSpPr>
+            <a:spLocks noGrp="1"/>
+          </p:cNvSpPr>
+          <p:nvPr>
+            <p:ph type="sldNum" sz="quarter" idx="10"/>
+          </p:nvPr>
+        </p:nvSpPr>
+        <p:spPr/>
+        <p:txBody>
+          <a:bodyPr/>
+          <a:lstStyle/>
+          <a:p>
+            <a:fld id="{9C98F037-C6EA-954E-A8AB-2225B8BC60C0}" type="slidenum">
+              <a:rPr lang="en-US" smtClean="0"/>
+              <a:t>27</a:t>
+            </a:fld>
+            <a:endParaRPr lang="en-US"/>
+          </a:p>
+        </p:txBody>
+      </p:sp>
+    </p:spTree>
+    <p:extLst>
+      <p:ext uri="{BB962C8B-B14F-4D97-AF65-F5344CB8AC3E}">
+        <p14:creationId xmlns:p14="http://schemas.microsoft.com/office/powerpoint/2010/main" val="99947593"/>
+      </p:ext>
+    </p:extLst>
+  </p:cSld>
+  <p:clrMapOvr>
+    <a:masterClrMapping/>
+  </p:clrMapOvr>
+</p:notes>
+</file>
+
+<file path=ppt/notesSlides/notesSlide19.xml><?xml version="1.0" encoding="utf-8"?>
+<p:notes xmlns:a="http://schemas.openxmlformats.org/drawingml/2006/main" xmlns:r="http://schemas.openxmlformats.org/officeDocument/2006/relationships" xmlns:p="http://schemas.openxmlformats.org/presentationml/2006/main">
+  <p:cSld>
+    <p:spTree>
+      <p:nvGrpSpPr>
+        <p:cNvPr id="1" name=""/>
+        <p:cNvGrpSpPr/>
+        <p:nvPr/>
+      </p:nvGrpSpPr>
+      <p:grpSpPr>
+        <a:xfrm>
+          <a:off x="0" y="0"/>
+          <a:ext cx="0" cy="0"/>
+          <a:chOff x="0" y="0"/>
+          <a:chExt cx="0" cy="0"/>
+        </a:xfrm>
+      </p:grpSpPr>
+      <p:sp>
+        <p:nvSpPr>
+          <p:cNvPr id="2" name="Slide Image Placeholder 1"/>
+          <p:cNvSpPr>
+            <a:spLocks noGrp="1" noRot="1" noChangeAspect="1"/>
+          </p:cNvSpPr>
+          <p:nvPr>
+            <p:ph type="sldImg"/>
+          </p:nvPr>
+        </p:nvSpPr>
+        <p:spPr/>
+      </p:sp>
+      <p:sp>
+        <p:nvSpPr>
+          <p:cNvPr id="3" name="Notes Placeholder 2"/>
+          <p:cNvSpPr>
+            <a:spLocks noGrp="1"/>
+          </p:cNvSpPr>
+          <p:nvPr>
+            <p:ph type="body" idx="1"/>
+          </p:nvPr>
+        </p:nvSpPr>
+        <p:spPr/>
+        <p:txBody>
+          <a:bodyPr/>
+          <a:lstStyle/>
+          <a:p>
+            <a:endParaRPr lang="en-US" dirty="0"/>
+          </a:p>
+        </p:txBody>
+      </p:sp>
+      <p:sp>
+        <p:nvSpPr>
+          <p:cNvPr id="4" name="Slide Number Placeholder 3"/>
+          <p:cNvSpPr>
+            <a:spLocks noGrp="1"/>
+          </p:cNvSpPr>
+          <p:nvPr>
+            <p:ph type="sldNum" sz="quarter" idx="10"/>
+          </p:nvPr>
+        </p:nvSpPr>
+        <p:spPr/>
+        <p:txBody>
+          <a:bodyPr/>
+          <a:lstStyle/>
+          <a:p>
+            <a:fld id="{9C98F037-C6EA-954E-A8AB-2225B8BC60C0}" type="slidenum">
+              <a:rPr lang="en-US" smtClean="0"/>
+              <a:t>28</a:t>
+            </a:fld>
+            <a:endParaRPr lang="en-US"/>
+          </a:p>
+        </p:txBody>
+      </p:sp>
+    </p:spTree>
+    <p:extLst>
+      <p:ext uri="{BB962C8B-B14F-4D97-AF65-F5344CB8AC3E}">
+        <p14:creationId xmlns:p14="http://schemas.microsoft.com/office/powerpoint/2010/main" val="219186850"/>
       </p:ext>
     </p:extLst>
   </p:cSld>
@@ -1079,10 +1701,6 @@
           <a:bodyPr/>
           <a:lstStyle/>
           <a:p>
-            <a:r>
-              <a:rPr lang="en-US" dirty="0" smtClean="0"/>
-              <a:t>SKIIIIIIP</a:t>
-            </a:r>
             <a:endParaRPr lang="en-US" dirty="0"/>
           </a:p>
         </p:txBody>
@@ -1113,7 +1731,7 @@
     </p:spTree>
     <p:extLst>
       <p:ext uri="{BB962C8B-B14F-4D97-AF65-F5344CB8AC3E}">
-        <p14:creationId xmlns:p14="http://schemas.microsoft.com/office/powerpoint/2010/main" val="3137071795"/>
+        <p14:creationId xmlns:p14="http://schemas.microsoft.com/office/powerpoint/2010/main" val="2286871980"/>
       </p:ext>
     </p:extLst>
   </p:cSld>
@@ -1167,10 +1785,6 @@
           <a:bodyPr/>
           <a:lstStyle/>
           <a:p>
-            <a:r>
-              <a:rPr lang="en-US" dirty="0" smtClean="0"/>
-              <a:t>SKIIIIIIP</a:t>
-            </a:r>
             <a:endParaRPr lang="en-US" dirty="0"/>
           </a:p>
         </p:txBody>
@@ -1201,7 +1815,7 @@
     </p:spTree>
     <p:extLst>
       <p:ext uri="{BB962C8B-B14F-4D97-AF65-F5344CB8AC3E}">
-        <p14:creationId xmlns:p14="http://schemas.microsoft.com/office/powerpoint/2010/main" val="2286871980"/>
+        <p14:creationId xmlns:p14="http://schemas.microsoft.com/office/powerpoint/2010/main" val="1998027349"/>
       </p:ext>
     </p:extLst>
   </p:cSld>
@@ -1255,6 +1869,32 @@
           <a:bodyPr/>
           <a:lstStyle/>
           <a:p>
+            <a:r>
+              <a:rPr lang="en-US" dirty="0" smtClean="0"/>
+              <a:t>Wher</a:t>
+            </a:r>
+            <a:r>
+              <a:rPr lang="en-US" baseline="0" dirty="0" smtClean="0"/>
+              <a:t>e I got turned on to the concept that hacking was a thing</a:t>
+            </a:r>
+          </a:p>
+          <a:p>
+            <a:endParaRPr lang="en-US" baseline="0" dirty="0" smtClean="0"/>
+          </a:p>
+          <a:p>
+            <a:r>
+              <a:rPr lang="en-US" baseline="0" dirty="0" smtClean="0"/>
+              <a:t>Telling this story because it gives you some great mindsets\</a:t>
+            </a:r>
+          </a:p>
+          <a:p>
+            <a:endParaRPr lang="en-US" baseline="0" dirty="0" smtClean="0"/>
+          </a:p>
+          <a:p>
+            <a:r>
+              <a:rPr lang="en-US" baseline="0" dirty="0" smtClean="0"/>
+              <a:t>Or HOW I GOT TO BE A PENTESTER</a:t>
+            </a:r>
             <a:endParaRPr lang="en-US" dirty="0"/>
           </a:p>
         </p:txBody>
@@ -1276,7 +1916,7 @@
           <a:p>
             <a:fld id="{9C98F037-C6EA-954E-A8AB-2225B8BC60C0}" type="slidenum">
               <a:rPr lang="en-US" smtClean="0"/>
-              <a:t>7</a:t>
+              <a:t>5</a:t>
             </a:fld>
             <a:endParaRPr lang="en-US"/>
           </a:p>
@@ -1285,7 +1925,7 @@
     </p:spTree>
     <p:extLst>
       <p:ext uri="{BB962C8B-B14F-4D97-AF65-F5344CB8AC3E}">
-        <p14:creationId xmlns:p14="http://schemas.microsoft.com/office/powerpoint/2010/main" val="1972131630"/>
+        <p14:creationId xmlns:p14="http://schemas.microsoft.com/office/powerpoint/2010/main" val="9376156"/>
       </p:ext>
     </p:extLst>
   </p:cSld>
@@ -1339,6 +1979,14 @@
           <a:bodyPr/>
           <a:lstStyle/>
           <a:p>
+            <a:r>
+              <a:rPr lang="en-US" dirty="0" smtClean="0"/>
+              <a:t>Cable boxes</a:t>
+            </a:r>
+            <a:r>
+              <a:rPr lang="en-US" baseline="0" dirty="0" smtClean="0"/>
+              <a:t> tracked by serial number </a:t>
+            </a:r>
             <a:endParaRPr lang="en-US" dirty="0"/>
           </a:p>
         </p:txBody>
@@ -1360,7 +2008,7 @@
           <a:p>
             <a:fld id="{9C98F037-C6EA-954E-A8AB-2225B8BC60C0}" type="slidenum">
               <a:rPr lang="en-US" smtClean="0"/>
-              <a:t>10</a:t>
+              <a:t>6</a:t>
             </a:fld>
             <a:endParaRPr lang="en-US"/>
           </a:p>
@@ -1369,7 +2017,7 @@
     </p:spTree>
     <p:extLst>
       <p:ext uri="{BB962C8B-B14F-4D97-AF65-F5344CB8AC3E}">
-        <p14:creationId xmlns:p14="http://schemas.microsoft.com/office/powerpoint/2010/main" val="4150671139"/>
+        <p14:creationId xmlns:p14="http://schemas.microsoft.com/office/powerpoint/2010/main" val="1651352878"/>
       </p:ext>
     </p:extLst>
   </p:cSld>
@@ -1425,7 +2073,19 @@
           <a:p>
             <a:r>
               <a:rPr lang="en-US" dirty="0" smtClean="0"/>
-              <a:t>BBS Documentary by Jason Scott</a:t>
+              <a:t>Don</a:t>
+            </a:r>
+            <a:r>
+              <a:rPr lang="uk-UA" dirty="0" smtClean="0"/>
+              <a:t>’</a:t>
+            </a:r>
+            <a:r>
+              <a:rPr lang="en-US" dirty="0" smtClean="0"/>
+              <a:t>t</a:t>
+            </a:r>
+            <a:r>
+              <a:rPr lang="en-US" baseline="0" dirty="0" smtClean="0"/>
+              <a:t> linger. Discuss it on next slide</a:t>
             </a:r>
             <a:endParaRPr lang="en-US" dirty="0"/>
           </a:p>
@@ -1448,7 +2108,7 @@
           <a:p>
             <a:fld id="{9C98F037-C6EA-954E-A8AB-2225B8BC60C0}" type="slidenum">
               <a:rPr lang="en-US" smtClean="0"/>
-              <a:t>11</a:t>
+              <a:t>7</a:t>
             </a:fld>
             <a:endParaRPr lang="en-US"/>
           </a:p>
@@ -1457,7 +2117,7 @@
     </p:spTree>
     <p:extLst>
       <p:ext uri="{BB962C8B-B14F-4D97-AF65-F5344CB8AC3E}">
-        <p14:creationId xmlns:p14="http://schemas.microsoft.com/office/powerpoint/2010/main" val="1183241388"/>
+        <p14:creationId xmlns:p14="http://schemas.microsoft.com/office/powerpoint/2010/main" val="1972131630"/>
       </p:ext>
     </p:extLst>
   </p:cSld>
@@ -1511,55 +2171,6 @@
           <a:bodyPr/>
           <a:lstStyle/>
           <a:p>
-            <a:r>
-              <a:rPr lang="en-US" dirty="0" smtClean="0"/>
-              <a:t>Sometimes</a:t>
-            </a:r>
-            <a:r>
-              <a:rPr lang="en-US" baseline="0" dirty="0" smtClean="0"/>
-              <a:t> got you network equipment. Rarely an application server.</a:t>
-            </a:r>
-          </a:p>
-          <a:p>
-            <a:endParaRPr lang="en-US" baseline="0" dirty="0" smtClean="0"/>
-          </a:p>
-          <a:p>
-            <a:r>
-              <a:rPr lang="en-US" baseline="0" dirty="0" smtClean="0"/>
-              <a:t>414s – Milwaukee-based hackers, the original </a:t>
-            </a:r>
-            <a:r>
-              <a:rPr lang="en-US" baseline="0" dirty="0" err="1" smtClean="0"/>
-              <a:t>Lulzsec</a:t>
-            </a:r>
-            <a:r>
-              <a:rPr lang="en-US" baseline="0" dirty="0" smtClean="0"/>
-              <a:t>. Broke into </a:t>
-            </a:r>
-            <a:r>
-              <a:rPr lang="en-US" baseline="0" dirty="0" err="1" smtClean="0"/>
-              <a:t>compnies</a:t>
-            </a:r>
-            <a:r>
-              <a:rPr lang="en-US" baseline="0" dirty="0" smtClean="0"/>
-              <a:t> via </a:t>
-            </a:r>
-            <a:r>
-              <a:rPr lang="en-US" baseline="0" dirty="0" err="1" smtClean="0"/>
-              <a:t>wardialing</a:t>
-            </a:r>
-            <a:r>
-              <a:rPr lang="en-US" baseline="0" dirty="0" smtClean="0"/>
-              <a:t> &amp; default passwords, or via well-known security exploits. Leader got onto the cover of </a:t>
-            </a:r>
-            <a:r>
-              <a:rPr lang="en-US" baseline="0" dirty="0" err="1" smtClean="0"/>
-              <a:t>newsweek</a:t>
-            </a:r>
-            <a:r>
-              <a:rPr lang="en-US" baseline="0" dirty="0" smtClean="0"/>
-              <a:t> for these simple hacks. </a:t>
-            </a:r>
             <a:endParaRPr lang="en-US" dirty="0"/>
           </a:p>
         </p:txBody>
@@ -1581,7 +2192,7 @@
           <a:p>
             <a:fld id="{9C98F037-C6EA-954E-A8AB-2225B8BC60C0}" type="slidenum">
               <a:rPr lang="en-US" smtClean="0"/>
-              <a:t>13</a:t>
+              <a:t>8</a:t>
             </a:fld>
             <a:endParaRPr lang="en-US"/>
           </a:p>
@@ -1590,7 +2201,7 @@
     </p:spTree>
     <p:extLst>
       <p:ext uri="{BB962C8B-B14F-4D97-AF65-F5344CB8AC3E}">
-        <p14:creationId xmlns:p14="http://schemas.microsoft.com/office/powerpoint/2010/main" val="2747697426"/>
+        <p14:creationId xmlns:p14="http://schemas.microsoft.com/office/powerpoint/2010/main" val="481395213"/>
       </p:ext>
     </p:extLst>
   </p:cSld>
@@ -1646,7 +2257,11 @@
           <a:p>
             <a:r>
               <a:rPr lang="en-US" dirty="0" smtClean="0"/>
-              <a:t>Extortion</a:t>
+              <a:t>Details</a:t>
+            </a:r>
+            <a:r>
+              <a:rPr lang="en-US" baseline="0" dirty="0" smtClean="0"/>
+              <a:t> on next slide</a:t>
             </a:r>
             <a:endParaRPr lang="en-US" dirty="0"/>
           </a:p>
@@ -1669,7 +2284,7 @@
           <a:p>
             <a:fld id="{9C98F037-C6EA-954E-A8AB-2225B8BC60C0}" type="slidenum">
               <a:rPr lang="en-US" smtClean="0"/>
-              <a:t>17</a:t>
+              <a:t>9</a:t>
             </a:fld>
             <a:endParaRPr lang="en-US"/>
           </a:p>
@@ -1678,7 +2293,7 @@
     </p:spTree>
     <p:extLst>
       <p:ext uri="{BB962C8B-B14F-4D97-AF65-F5344CB8AC3E}">
-        <p14:creationId xmlns:p14="http://schemas.microsoft.com/office/powerpoint/2010/main" val="1644058500"/>
+        <p14:creationId xmlns:p14="http://schemas.microsoft.com/office/powerpoint/2010/main" val="1115889936"/>
       </p:ext>
     </p:extLst>
   </p:cSld>
@@ -1732,14 +2347,6 @@
           <a:bodyPr/>
           <a:lstStyle/>
           <a:p>
-            <a:r>
-              <a:rPr lang="en-US" dirty="0" smtClean="0"/>
-              <a:t>Order stuff and have it shipped</a:t>
-            </a:r>
-            <a:r>
-              <a:rPr lang="en-US" baseline="0" dirty="0" smtClean="0"/>
-              <a:t> to your local abandoned house</a:t>
-            </a:r>
             <a:endParaRPr lang="en-US" dirty="0"/>
           </a:p>
         </p:txBody>
@@ -1761,7 +2368,7 @@
           <a:p>
             <a:fld id="{9C98F037-C6EA-954E-A8AB-2225B8BC60C0}" type="slidenum">
               <a:rPr lang="en-US" smtClean="0"/>
-              <a:t>19</a:t>
+              <a:t>10</a:t>
             </a:fld>
             <a:endParaRPr lang="en-US"/>
           </a:p>
@@ -1770,7 +2377,7 @@
     </p:spTree>
     <p:extLst>
       <p:ext uri="{BB962C8B-B14F-4D97-AF65-F5344CB8AC3E}">
-        <p14:creationId xmlns:p14="http://schemas.microsoft.com/office/powerpoint/2010/main" val="1510660372"/>
+        <p14:creationId xmlns:p14="http://schemas.microsoft.com/office/powerpoint/2010/main" val="4150671139"/>
       </p:ext>
     </p:extLst>
   </p:cSld>
@@ -1998,7 +2605,7 @@
             <a:fld id="{DB32461A-250E-4A29-9E9B-599CA3838FA1}" type="datetime1">
               <a:rPr lang="en-US" smtClean="0"/>
               <a:pPr/>
-              <a:t>11/7/15</a:t>
+              <a:t>7/20/16</a:t>
             </a:fld>
             <a:endParaRPr lang="en-US" dirty="0"/>
           </a:p>
@@ -2165,7 +2772,7 @@
             <a:fld id="{78C81099-48EC-46A3-9530-F58EB96AF77C}" type="datetime1">
               <a:rPr lang="en-US" smtClean="0"/>
               <a:pPr/>
-              <a:t>11/7/15</a:t>
+              <a:t>7/20/16</a:t>
             </a:fld>
             <a:endParaRPr lang="en-US"/>
           </a:p>
@@ -2342,7 +2949,7 @@
             <a:fld id="{FF697E24-FFB9-4C73-8C6D-E02A7AD33DB8}" type="datetime1">
               <a:rPr lang="en-US" smtClean="0"/>
               <a:pPr/>
-              <a:t>11/7/15</a:t>
+              <a:t>7/20/16</a:t>
             </a:fld>
             <a:endParaRPr lang="en-US"/>
           </a:p>
@@ -2514,7 +3121,7 @@
             <a:fld id="{DF1AD66C-382E-48AD-8F4C-E87C4D4A8B28}" type="datetime1">
               <a:rPr lang="en-US" smtClean="0"/>
               <a:pPr/>
-              <a:t>11/7/15</a:t>
+              <a:t>7/20/16</a:t>
             </a:fld>
             <a:endParaRPr lang="en-US"/>
           </a:p>
@@ -2639,7 +3246,7 @@
             <a:fld id="{26F4ADA4-35DF-4BD1-8C53-4246F035229A}" type="datetime1">
               <a:rPr lang="en-US" smtClean="0"/>
               <a:pPr/>
-              <a:t>11/7/15</a:t>
+              <a:t>7/20/16</a:t>
             </a:fld>
             <a:endParaRPr lang="en-US"/>
           </a:p>
@@ -3031,7 +3638,7 @@
             <a:fld id="{659F63ED-02B1-490A-8EAD-E0CB136D5388}" type="datetime1">
               <a:rPr lang="en-US" smtClean="0"/>
               <a:pPr/>
-              <a:t>11/7/15</a:t>
+              <a:t>7/20/16</a:t>
             </a:fld>
             <a:endParaRPr lang="en-US"/>
           </a:p>
@@ -3522,7 +4129,7 @@
             <a:fld id="{6F771BB6-685D-4518-8FAD-1882B9671546}" type="datetime1">
               <a:rPr lang="en-US" smtClean="0"/>
               <a:pPr/>
-              <a:t>11/7/15</a:t>
+              <a:t>7/20/16</a:t>
             </a:fld>
             <a:endParaRPr lang="en-US"/>
           </a:p>
@@ -3637,7 +4244,7 @@
             <a:fld id="{465FFBFE-5C08-4E0E-AF38-FB925F0B4D71}" type="datetime1">
               <a:rPr lang="en-US" smtClean="0"/>
               <a:pPr/>
-              <a:t>11/7/15</a:t>
+              <a:t>7/20/16</a:t>
             </a:fld>
             <a:endParaRPr lang="en-US"/>
           </a:p>
@@ -3762,7 +4369,7 @@
             <a:fld id="{3823242C-D747-4ADD-80D8-99421268E3A8}" type="datetime1">
               <a:rPr lang="en-US" smtClean="0"/>
               <a:pPr/>
-              <a:t>11/7/15</a:t>
+              <a:t>7/20/16</a:t>
             </a:fld>
             <a:endParaRPr lang="en-US" dirty="0"/>
           </a:p>
@@ -3953,7 +4560,7 @@
             <a:fld id="{06E82007-CDD1-4BCF-B9F4-9D458EFEEFE1}" type="datetime1">
               <a:rPr lang="en-US" smtClean="0"/>
               <a:pPr/>
-              <a:t>11/7/15</a:t>
+              <a:t>7/20/16</a:t>
             </a:fld>
             <a:endParaRPr lang="en-US"/>
           </a:p>
@@ -4338,7 +4945,7 @@
             <a:fld id="{34A4F265-CA88-4C30-A9AD-02E6A5184734}" type="datetime1">
               <a:rPr lang="en-US" smtClean="0"/>
               <a:pPr/>
-              <a:t>11/7/15</a:t>
+              <a:t>7/20/16</a:t>
             </a:fld>
             <a:endParaRPr lang="en-US"/>
           </a:p>
@@ -4576,7 +5183,7 @@
             <a:fld id="{3823242C-D747-4ADD-80D8-99421268E3A8}" type="datetime1">
               <a:rPr lang="en-US" smtClean="0"/>
               <a:pPr/>
-              <a:t>11/7/15</a:t>
+              <a:t>7/20/16</a:t>
             </a:fld>
             <a:endParaRPr lang="en-US" dirty="0"/>
           </a:p>
@@ -5041,15 +5648,19 @@
           <a:lstStyle/>
           <a:p>
             <a:r>
-              <a:rPr lang="en-US" sz="2800" dirty="0" smtClean="0"/>
+              <a:rPr lang="en-US" sz="4400" b="1" dirty="0" smtClean="0"/>
               <a:t>Get OFF MY LAN!</a:t>
             </a:r>
             <a:br>
-              <a:rPr lang="en-US" sz="2800" dirty="0" smtClean="0"/>
+              <a:rPr lang="en-US" sz="4400" b="1" dirty="0" smtClean="0"/>
             </a:br>
             <a:r>
               <a:rPr lang="en-US" sz="1800" dirty="0" smtClean="0"/>
-              <a:t>(Hacking in the olden days)</a:t>
+              <a:t>(Hacking </a:t>
+            </a:r>
+            <a:r>
+              <a:rPr lang="en-US" sz="1800" dirty="0" smtClean="0"/>
+              <a:t>in the80’s &amp; 90’s)</a:t>
             </a:r>
             <a:r>
               <a:rPr lang="en-US" sz="1800" dirty="0"/>
@@ -5058,49 +5669,6 @@
             <a:br>
               <a:rPr lang="en-US" sz="1800" dirty="0"/>
             </a:br>
-            <a:r>
-              <a:rPr lang="en-US" sz="2800" dirty="0" smtClean="0"/>
-              <a:t/>
-            </a:r>
-            <a:br>
-              <a:rPr lang="en-US" sz="2800" dirty="0" smtClean="0"/>
-            </a:br>
-            <a:r>
-              <a:rPr lang="en-US" sz="1400" dirty="0" smtClean="0"/>
-              <a:t> </a:t>
-            </a:r>
-            <a:r>
-              <a:rPr lang="en-US" sz="1400" dirty="0" smtClean="0"/>
-              <a:t>(</a:t>
-            </a:r>
-            <a:r>
-              <a:rPr lang="en-US" sz="1400" dirty="0"/>
-              <a:t>La </a:t>
-            </a:r>
-            <a:r>
-              <a:rPr lang="en-US" sz="1400" dirty="0" err="1"/>
-              <a:t>magie</a:t>
-            </a:r>
-            <a:r>
-              <a:rPr lang="en-US" sz="1400" dirty="0"/>
-              <a:t> du grand-</a:t>
-            </a:r>
-            <a:r>
-              <a:rPr lang="en-US" sz="1400" dirty="0" err="1"/>
-              <a:t>père</a:t>
-            </a:r>
-            <a:r>
-              <a:rPr lang="en-US" sz="1400" dirty="0"/>
-              <a:t> pour la </a:t>
-            </a:r>
-            <a:r>
-              <a:rPr lang="en-US" sz="1400" dirty="0" err="1"/>
-              <a:t>technologie</a:t>
-            </a:r>
-            <a:r>
-              <a:rPr lang="en-US" sz="1400" dirty="0"/>
-              <a:t>)</a:t>
-            </a:r>
             <a:endParaRPr lang="en-US" sz="1400" dirty="0"/>
           </a:p>
         </p:txBody>
@@ -5136,8 +5704,8 @@
         </p:nvSpPr>
         <p:spPr>
           <a:xfrm>
-            <a:off x="5952818" y="3443129"/>
-            <a:ext cx="4644573" cy="800219"/>
+            <a:off x="3041584" y="3443128"/>
+            <a:ext cx="5861762" cy="646331"/>
           </a:xfrm>
           <a:prstGeom prst="rect">
             <a:avLst/>
@@ -5150,8 +5718,9 @@
           </a:bodyPr>
           <a:lstStyle/>
           <a:p>
-            <a:r>
-              <a:rPr lang="en-US" sz="2800" dirty="0" smtClean="0">
+            <a:pPr algn="ctr"/>
+            <a:r>
+              <a:rPr lang="en-US" sz="2000" dirty="0" smtClean="0">
                 <a:solidFill>
                   <a:schemeClr val="tx1">
                     <a:lumMod val="75000"/>
@@ -5159,12 +5728,21 @@
                   </a:schemeClr>
                 </a:solidFill>
               </a:rPr>
-              <a:t>@j0hnnyXm4s</a:t>
-            </a:r>
-          </a:p>
-          <a:p>
-            <a:r>
-              <a:rPr lang="en-US" dirty="0" smtClean="0">
+              <a:t>Antonio “Johnny Xmas” Martinelli</a:t>
+            </a:r>
+            <a:endParaRPr lang="en-US" sz="2000" dirty="0" smtClean="0">
+              <a:solidFill>
+                <a:schemeClr val="tx1">
+                  <a:lumMod val="75000"/>
+                  <a:lumOff val="25000"/>
+                </a:schemeClr>
+              </a:solidFill>
+            </a:endParaRPr>
+          </a:p>
+          <a:p>
+            <a:pPr algn="ctr"/>
+            <a:r>
+              <a:rPr lang="en-US" sz="1600" dirty="0" smtClean="0">
                 <a:solidFill>
                   <a:schemeClr val="tx1">
                     <a:lumMod val="75000"/>
@@ -5175,7 +5753,7 @@
               <a:t>CISSP</a:t>
             </a:r>
             <a:r>
-              <a:rPr lang="en-US" dirty="0">
+              <a:rPr lang="en-US" sz="1600" dirty="0">
                 <a:solidFill>
                   <a:schemeClr val="tx1">
                     <a:lumMod val="75000"/>
@@ -5186,7 +5764,7 @@
               <a:t>, </a:t>
             </a:r>
             <a:r>
-              <a:rPr lang="en-US" dirty="0" smtClean="0">
+              <a:rPr lang="en-US" sz="1600" dirty="0" smtClean="0">
                 <a:solidFill>
                   <a:schemeClr val="tx1">
                     <a:lumMod val="75000"/>
@@ -5301,16 +5879,33 @@
             <p:ph idx="1"/>
           </p:nvPr>
         </p:nvSpPr>
-        <p:spPr/>
+        <p:spPr>
+          <a:xfrm>
+            <a:off x="1371600" y="1593130"/>
+            <a:ext cx="6400799" cy="2678392"/>
+          </a:xfrm>
+        </p:spPr>
         <p:txBody>
           <a:bodyPr>
-            <a:normAutofit fontScale="70000" lnSpcReduction="20000"/>
+            <a:normAutofit fontScale="85000" lnSpcReduction="20000"/>
           </a:bodyPr>
           <a:lstStyle/>
           <a:p>
             <a:r>
               <a:rPr lang="en-US" dirty="0" smtClean="0"/>
-              <a:t>Found scattered across a million BBS servers</a:t>
+              <a:t>Found scattered across </a:t>
+            </a:r>
+            <a:r>
+              <a:rPr lang="en-US" dirty="0" smtClean="0"/>
+              <a:t>hundreds of </a:t>
+            </a:r>
+            <a:r>
+              <a:rPr lang="en-US" dirty="0" smtClean="0"/>
+              <a:t>BBS </a:t>
+            </a:r>
+            <a:r>
+              <a:rPr lang="en-US" dirty="0" smtClean="0"/>
+              <a:t>servers</a:t>
             </a:r>
           </a:p>
           <a:p>
@@ -5352,13 +5947,14 @@
             <a:pPr lvl="1"/>
             <a:r>
               <a:rPr lang="en-US" dirty="0" smtClean="0"/>
-              <a:t>0days</a:t>
-            </a:r>
+              <a:t>BBS HACKS</a:t>
+            </a:r>
+            <a:endParaRPr lang="en-US" dirty="0" smtClean="0"/>
           </a:p>
           <a:p>
             <a:pPr lvl="1"/>
             <a:r>
-              <a:rPr lang="en-US" dirty="0" err="1" smtClean="0"/>
+              <a:rPr lang="en-US" dirty="0" smtClean="0"/>
               <a:t>Warez</a:t>
             </a:r>
             <a:endParaRPr lang="en-US" dirty="0" smtClean="0"/>
@@ -5383,8 +5979,9 @@
             </a:r>
             <a:r>
               <a:rPr lang="en-US" dirty="0" smtClean="0"/>
-              <a:t>)</a:t>
-            </a:r>
+              <a:t>) &amp; 0days</a:t>
+            </a:r>
+            <a:endParaRPr lang="en-US" dirty="0" smtClean="0"/>
           </a:p>
           <a:p>
             <a:pPr lvl="1"/>
@@ -5550,26 +6147,14 @@
           </a:p>
           <a:p>
             <a:r>
-              <a:rPr lang="en-US" dirty="0"/>
-              <a:t>Rabbit hole: </a:t>
+              <a:rPr lang="en-US" dirty="0" smtClean="0"/>
+              <a:t>BBS (The Documentary): </a:t>
             </a:r>
             <a:r>
               <a:rPr lang="en-US" dirty="0">
                 <a:hlinkClick r:id="rId3"/>
               </a:rPr>
-              <a:t>http://</a:t>
-            </a:r>
-            <a:r>
-              <a:rPr lang="en-US" dirty="0" err="1">
-                <a:hlinkClick r:id="rId3"/>
-              </a:rPr>
-              <a:t>youtu.be</a:t>
-            </a:r>
-            <a:r>
-              <a:rPr lang="en-US" dirty="0">
-                <a:hlinkClick r:id="rId3"/>
-              </a:rPr>
-              <a:t>/mJgRHYw9-fU</a:t>
+              <a:t>http://youtu.be/mJgRHYw9-fU</a:t>
             </a:r>
             <a:endParaRPr lang="en-US" dirty="0" smtClean="0"/>
           </a:p>
@@ -5752,7 +6337,15 @@
           <a:p>
             <a:r>
               <a:rPr lang="en-US" dirty="0" smtClean="0"/>
-              <a:t>Named after War Games. Usually got you a mainframe.</a:t>
+              <a:t>Named after War Games. Usually </a:t>
+            </a:r>
+            <a:r>
+              <a:rPr lang="en-US" dirty="0" smtClean="0"/>
+              <a:t>a </a:t>
+            </a:r>
+            <a:r>
+              <a:rPr lang="en-US" dirty="0" smtClean="0"/>
+              <a:t>mainframe.</a:t>
             </a:r>
           </a:p>
           <a:p>
@@ -5778,7 +6371,15 @@
           <a:p>
             <a:r>
               <a:rPr lang="en-US" dirty="0" smtClean="0"/>
-              <a:t>Dialing direct into servers bypassed all perimeter security</a:t>
+              <a:t>Dialing direct </a:t>
+            </a:r>
+            <a:r>
+              <a:rPr lang="en-US" dirty="0" smtClean="0"/>
+              <a:t>to </a:t>
+            </a:r>
+            <a:r>
+              <a:rPr lang="en-US" dirty="0" smtClean="0"/>
+              <a:t>servers bypassed all perimeter security</a:t>
             </a:r>
           </a:p>
           <a:p>
@@ -5815,6 +6416,36 @@
           </a:p>
         </p:txBody>
       </p:sp>
+      <p:pic>
+        <p:nvPicPr>
+          <p:cNvPr id="4" name="Picture 3"/>
+          <p:cNvPicPr>
+            <a:picLocks noChangeAspect="1"/>
+          </p:cNvPicPr>
+          <p:nvPr/>
+        </p:nvPicPr>
+        <p:blipFill>
+          <a:blip r:embed="rId4">
+            <a:extLst>
+              <a:ext uri="{28A0092B-C50C-407E-A947-70E740481C1C}">
+                <a14:useLocalDpi xmlns:a14="http://schemas.microsoft.com/office/drawing/2010/main" val="0"/>
+              </a:ext>
+            </a:extLst>
+          </a:blip>
+          <a:stretch>
+            <a:fillRect/>
+          </a:stretch>
+        </p:blipFill>
+        <p:spPr>
+          <a:xfrm>
+            <a:off x="6414605" y="1828800"/>
+            <a:ext cx="1781961" cy="2286001"/>
+          </a:xfrm>
+          <a:prstGeom prst="rect">
+            <a:avLst/>
+          </a:prstGeom>
+        </p:spPr>
+      </p:pic>
     </p:spTree>
     <p:extLst>
       <p:ext uri="{BB962C8B-B14F-4D97-AF65-F5344CB8AC3E}">
@@ -5825,6 +6456,13 @@
   <p:clrMapOvr>
     <a:masterClrMapping/>
   </p:clrMapOvr>
+  <p:timing>
+    <p:tnLst>
+      <p:par>
+        <p:cTn id="1" dur="indefinite" restart="never" nodeType="tmRoot"/>
+      </p:par>
+    </p:tnLst>
+  </p:timing>
 </p:sld>
 </file>
 
@@ -5903,7 +6541,11 @@
           <a:p>
             <a:r>
               <a:rPr lang="en-US" dirty="0" smtClean="0"/>
-              <a:t>EVERYTHING HAD A PUBLIC IP!!</a:t>
+              <a:t>TONS OF STUFF ALSO </a:t>
+            </a:r>
+            <a:r>
+              <a:rPr lang="en-US" dirty="0" smtClean="0"/>
+              <a:t>HAD A PUBLIC IP!!</a:t>
             </a:r>
           </a:p>
           <a:p>
@@ -5915,8 +6557,13 @@
           <a:p>
             <a:r>
               <a:rPr lang="en-US" dirty="0" smtClean="0"/>
-              <a:t>Every server ran FTP</a:t>
-            </a:r>
+              <a:t>Every server ran </a:t>
+            </a:r>
+            <a:r>
+              <a:rPr lang="en-US" dirty="0" smtClean="0"/>
+              <a:t>FTP. . .as root</a:t>
+            </a:r>
+            <a:endParaRPr lang="en-US" dirty="0" smtClean="0"/>
           </a:p>
           <a:p>
             <a:r>
@@ -5937,6 +6584,13 @@
   <p:clrMapOvr>
     <a:masterClrMapping/>
   </p:clrMapOvr>
+  <p:timing>
+    <p:tnLst>
+      <p:par>
+        <p:cTn id="1" dur="indefinite" restart="never" nodeType="tmRoot"/>
+      </p:par>
+    </p:tnLst>
+  </p:timing>
 </p:sld>
 </file>
 
@@ -6015,8 +6669,13 @@
           <a:p>
             <a:r>
               <a:rPr lang="en-US" dirty="0" smtClean="0"/>
-              <a:t>Crashing FTP usually dropped you to a root prompt</a:t>
-            </a:r>
+              <a:t>Crashing FTP </a:t>
+            </a:r>
+            <a:r>
+              <a:rPr lang="en-US" dirty="0" smtClean="0"/>
+              <a:t>service run as root gets you what?</a:t>
+            </a:r>
+            <a:endParaRPr lang="en-US" dirty="0" smtClean="0"/>
           </a:p>
           <a:p>
             <a:pPr lvl="1"/>
@@ -6047,7 +6706,15 @@
             </a:r>
             <a:r>
               <a:rPr lang="en-US" dirty="0" smtClean="0"/>
-              <a:t> didn’t used to have ASCII output</a:t>
+              <a:t> </a:t>
+            </a:r>
+            <a:r>
+              <a:rPr lang="en-US" dirty="0" smtClean="0"/>
+              <a:t>didn’t </a:t>
+            </a:r>
+            <a:r>
+              <a:rPr lang="en-US" dirty="0" smtClean="0"/>
+              <a:t>have ASCII output</a:t>
             </a:r>
           </a:p>
           <a:p>
@@ -6061,7 +6728,11 @@
             <a:pPr lvl="1"/>
             <a:r>
               <a:rPr lang="en-US" dirty="0" smtClean="0"/>
-              <a:t>6-character passwords were common, sometimes mandatory</a:t>
+              <a:t>4 or 6-character </a:t>
+            </a:r>
+            <a:r>
+              <a:rPr lang="en-US" dirty="0" smtClean="0"/>
+              <a:t>passwords were common, sometimes mandatory</a:t>
             </a:r>
             <a:endParaRPr lang="en-US" dirty="0"/>
           </a:p>
@@ -6077,6 +6748,13 @@
   <p:clrMapOvr>
     <a:masterClrMapping/>
   </p:clrMapOvr>
+  <p:timing>
+    <p:tnLst>
+      <p:par>
+        <p:cTn id="1" dur="indefinite" restart="never" nodeType="tmRoot"/>
+      </p:par>
+    </p:tnLst>
+  </p:timing>
 </p:sld>
 </file>
 
@@ -6188,6 +6866,13 @@
   <p:clrMapOvr>
     <a:masterClrMapping/>
   </p:clrMapOvr>
+  <p:timing>
+    <p:tnLst>
+      <p:par>
+        <p:cTn id="1" dur="indefinite" restart="never" nodeType="tmRoot"/>
+      </p:par>
+    </p:tnLst>
+  </p:timing>
 </p:sld>
 </file>
 
@@ -6227,7 +6912,11 @@
           <a:p>
             <a:r>
               <a:rPr lang="en-US" sz="2000" dirty="0" smtClean="0"/>
-              <a:t>Stuff people who weren’t me did</a:t>
+              <a:t>Stuff </a:t>
+            </a:r>
+            <a:r>
+              <a:rPr lang="en-US" sz="2000" dirty="0" smtClean="0"/>
+              <a:t>people who weren’t me did</a:t>
             </a:r>
             <a:endParaRPr lang="en-US" sz="2000" dirty="0"/>
           </a:p>
@@ -6294,6 +6983,13 @@
   <p:clrMapOvr>
     <a:masterClrMapping/>
   </p:clrMapOvr>
+  <p:timing>
+    <p:tnLst>
+      <p:par>
+        <p:cTn id="1" dur="indefinite" restart="never" nodeType="tmRoot"/>
+      </p:par>
+    </p:tnLst>
+  </p:timing>
 </p:sld>
 </file>
 
@@ -6379,6 +7075,13 @@
   <p:clrMapOvr>
     <a:masterClrMapping/>
   </p:clrMapOvr>
+  <p:timing>
+    <p:tnLst>
+      <p:par>
+        <p:cTn id="1" dur="indefinite" restart="never" nodeType="tmRoot"/>
+      </p:par>
+    </p:tnLst>
+  </p:timing>
 </p:sld>
 </file>
 
@@ -6500,6 +7203,13 @@
   <p:clrMapOvr>
     <a:masterClrMapping/>
   </p:clrMapOvr>
+  <p:timing>
+    <p:tnLst>
+      <p:par>
+        <p:cTn id="1" dur="indefinite" restart="never" nodeType="tmRoot"/>
+      </p:par>
+    </p:tnLst>
+  </p:timing>
 </p:sld>
 </file>
 
@@ -6539,7 +7249,11 @@
           <a:p>
             <a:r>
               <a:rPr lang="en-US" dirty="0" smtClean="0"/>
-              <a:t>Who is this 1337 HAXOR?</a:t>
+              <a:t>$&gt;</a:t>
+            </a:r>
+            <a:r>
+              <a:rPr lang="en-US" dirty="0" err="1" smtClean="0"/>
+              <a:t>whoami</a:t>
             </a:r>
             <a:endParaRPr lang="en-US" dirty="0"/>
           </a:p>
@@ -6564,49 +7278,78 @@
           <a:p>
             <a:r>
               <a:rPr lang="en-US" dirty="0" smtClean="0"/>
-              <a:t>#BLUETEAMGO</a:t>
+              <a:t>#REDTEAMGO</a:t>
             </a:r>
           </a:p>
           <a:p>
             <a:pPr lvl="1"/>
             <a:r>
               <a:rPr lang="en-US" dirty="0" smtClean="0"/>
-              <a:t>CISSP</a:t>
+              <a:t>GIAC-GPEN Penetration </a:t>
+            </a:r>
+            <a:r>
+              <a:rPr lang="en-US" dirty="0" smtClean="0"/>
+              <a:t>Tester</a:t>
             </a:r>
           </a:p>
           <a:p>
             <a:pPr lvl="1"/>
             <a:r>
               <a:rPr lang="en-US" dirty="0" smtClean="0"/>
-              <a:t>Sr. Information Security Engineer for Global 1000 \ Fortune 500</a:t>
-            </a:r>
-          </a:p>
-          <a:p>
-            <a:pPr lvl="1"/>
-            <a:r>
-              <a:rPr lang="en-US" dirty="0" smtClean="0"/>
-              <a:t>Designed some really cool stuff like:</a:t>
+              <a:t>Penetration Tester for RedLegg International</a:t>
             </a:r>
           </a:p>
           <a:p>
             <a:pPr lvl="2"/>
             <a:r>
               <a:rPr lang="en-US" dirty="0" smtClean="0"/>
-              <a:t>Drop-in, secure  password auditing (cracking) systems</a:t>
+              <a:t>Top-to-bottom, context &amp; threat-based security assessments</a:t>
             </a:r>
           </a:p>
           <a:p>
             <a:pPr lvl="2"/>
             <a:r>
               <a:rPr lang="en-US" dirty="0" smtClean="0"/>
-              <a:t>WIDS system for Bluetooth to monitor for BT debit card skimmers</a:t>
-            </a:r>
-          </a:p>
-          <a:p>
-            <a:pPr lvl="1"/>
-            <a:r>
-              <a:rPr lang="en-US" dirty="0" smtClean="0"/>
-              <a:t>One of the only people on Earth (apparently) who knows TCL</a:t>
+              <a:t>Very </a:t>
+            </a:r>
+            <a:r>
+              <a:rPr lang="en-US" dirty="0" smtClean="0"/>
+              <a:t>large, global </a:t>
+            </a:r>
+            <a:r>
+              <a:rPr lang="en-US" dirty="0" smtClean="0"/>
+              <a:t>clients. Financial, Retail, </a:t>
+            </a:r>
+            <a:r>
+              <a:rPr lang="en-US" dirty="0" err="1" smtClean="0"/>
+              <a:t>eComm</a:t>
+            </a:r>
+            <a:r>
+              <a:rPr lang="en-US" dirty="0" smtClean="0"/>
+              <a:t>, nonprofit</a:t>
+            </a:r>
+            <a:r>
+              <a:rPr lang="en-US" dirty="0" smtClean="0"/>
+              <a:t>, etc.</a:t>
+            </a:r>
+          </a:p>
+          <a:p>
+            <a:pPr lvl="2"/>
+            <a:r>
+              <a:rPr lang="en-US" dirty="0" smtClean="0"/>
+              <a:t>Seriously vicious phishing campaigns</a:t>
+            </a:r>
+            <a:endParaRPr lang="en-US" dirty="0"/>
+          </a:p>
+          <a:p>
+            <a:pPr lvl="2"/>
+            <a:r>
+              <a:rPr lang="en-US" dirty="0" smtClean="0"/>
+              <a:t>I rob </a:t>
+            </a:r>
+            <a:r>
+              <a:rPr lang="en-US" dirty="0" smtClean="0"/>
+              <a:t>banks</a:t>
             </a:r>
           </a:p>
         </p:txBody>
@@ -6614,7 +7357,7 @@
     </p:spTree>
     <p:extLst>
       <p:ext uri="{BB962C8B-B14F-4D97-AF65-F5344CB8AC3E}">
-        <p14:creationId xmlns:p14="http://schemas.microsoft.com/office/powerpoint/2010/main" val="375237307"/>
+        <p14:creationId xmlns:p14="http://schemas.microsoft.com/office/powerpoint/2010/main" val="380244354"/>
       </p:ext>
     </p:extLst>
   </p:cSld>
@@ -6667,7 +7410,11 @@
           <a:p>
             <a:r>
               <a:rPr lang="en-US" sz="2800" dirty="0" smtClean="0"/>
-              <a:t>HACKERS VS CRACKERS (1993)</a:t>
+              <a:t>HACKERS VS CRACKERS (</a:t>
+            </a:r>
+            <a:r>
+              <a:rPr lang="en-US" sz="2800" dirty="0" smtClean="0"/>
+              <a:t>1995)</a:t>
             </a:r>
             <a:endParaRPr lang="en-US" sz="2800" dirty="0"/>
           </a:p>
@@ -6727,14 +7474,26 @@
           <a:p>
             <a:r>
               <a:rPr lang="en-US" dirty="0" smtClean="0"/>
-              <a:t>Crackers were decidedly malicious</a:t>
+              <a:t>Crackers were </a:t>
+            </a:r>
+            <a:r>
+              <a:rPr lang="en-US" dirty="0" smtClean="0"/>
+              <a:t>unskilled, malicious </a:t>
+            </a:r>
+            <a:r>
+              <a:rPr lang="en-US" dirty="0" smtClean="0"/>
+              <a:t>pirates</a:t>
             </a:r>
           </a:p>
           <a:p>
             <a:pPr lvl="1"/>
             <a:r>
               <a:rPr lang="en-US" dirty="0" smtClean="0"/>
-              <a:t>Writing viruses, taking over servers, defacing websites, stealing info</a:t>
+              <a:t>Writing </a:t>
+            </a:r>
+            <a:r>
+              <a:rPr lang="en-US" dirty="0" smtClean="0"/>
+              <a:t>viruses, taking over servers, defacing websites, stealing info</a:t>
             </a:r>
           </a:p>
           <a:p>
@@ -6778,6 +7537,13 @@
   <p:clrMapOvr>
     <a:masterClrMapping/>
   </p:clrMapOvr>
+  <p:timing>
+    <p:tnLst>
+      <p:par>
+        <p:cTn id="1" dur="indefinite" restart="never" nodeType="tmRoot"/>
+      </p:par>
+    </p:tnLst>
+  </p:timing>
 </p:sld>
 </file>
 
@@ -6817,7 +7583,19 @@
           <a:p>
             <a:r>
               <a:rPr lang="en-US" sz="2800" dirty="0" smtClean="0"/>
-              <a:t>HACKERS VS CRACKERS (1995)</a:t>
+              <a:t>HACKERS VS CRACKERS </a:t>
+            </a:r>
+            <a:r>
+              <a:rPr lang="en-US" sz="2800" dirty="0" smtClean="0"/>
+              <a:t>(</a:t>
+            </a:r>
+            <a:r>
+              <a:rPr lang="en-US" sz="2800" dirty="0" smtClean="0"/>
+              <a:t>Y2K</a:t>
+            </a:r>
+            <a:r>
+              <a:rPr lang="en-US" sz="2800" dirty="0" smtClean="0"/>
+              <a:t>)</a:t>
             </a:r>
             <a:endParaRPr lang="en-US" sz="2800" dirty="0"/>
           </a:p>
@@ -6927,6 +7705,13 @@
   <p:clrMapOvr>
     <a:masterClrMapping/>
   </p:clrMapOvr>
+  <p:timing>
+    <p:tnLst>
+      <p:par>
+        <p:cTn id="1" dur="indefinite" restart="never" nodeType="tmRoot"/>
+      </p:par>
+    </p:tnLst>
+  </p:timing>
 </p:sld>
 </file>
 
@@ -7172,6 +7957,70 @@
           <a:lstStyle/>
           <a:p>
             <a:r>
+              <a:rPr lang="en-US" dirty="0" err="1" smtClean="0"/>
+              <a:t>DoS</a:t>
+            </a:r>
+            <a:r>
+              <a:rPr lang="en-US" dirty="0" smtClean="0"/>
+              <a:t> </a:t>
+            </a:r>
+            <a:r>
+              <a:rPr lang="en-US" dirty="0" smtClean="0"/>
+              <a:t>by sending SYN with </a:t>
+            </a:r>
+            <a:r>
+              <a:rPr lang="en-US" dirty="0" err="1" smtClean="0"/>
+              <a:t>Src</a:t>
+            </a:r>
+            <a:r>
+              <a:rPr lang="en-US" dirty="0" smtClean="0"/>
+              <a:t> IP = </a:t>
+            </a:r>
+            <a:r>
+              <a:rPr lang="en-US" dirty="0" err="1" smtClean="0"/>
+              <a:t>Dst</a:t>
+            </a:r>
+            <a:r>
+              <a:rPr lang="en-US" dirty="0" smtClean="0"/>
+              <a:t> IP</a:t>
+            </a:r>
+          </a:p>
+          <a:p>
+            <a:r>
+              <a:rPr lang="en-US" dirty="0" smtClean="0"/>
+              <a:t>Affected Windows NT, 95, HP-UX, some printers in 1997.</a:t>
+            </a:r>
+          </a:p>
+          <a:p>
+            <a:pPr lvl="1"/>
+            <a:r>
+              <a:rPr lang="en-US" dirty="0" smtClean="0"/>
+              <a:t>Patch simply commented out problem code</a:t>
+            </a:r>
+          </a:p>
+          <a:p>
+            <a:r>
+              <a:rPr lang="en-US" dirty="0" smtClean="0"/>
+              <a:t>Discovered to affect Windows 98 – 2003 Server in </a:t>
+            </a:r>
+            <a:r>
+              <a:rPr lang="en-US" b="1" u="sng" dirty="0" smtClean="0"/>
+              <a:t>2005</a:t>
+            </a:r>
+          </a:p>
+          <a:p>
+            <a:pPr lvl="1"/>
+            <a:r>
+              <a:rPr lang="en-US" dirty="0" smtClean="0"/>
+              <a:t>New dev simply uncommented the old </a:t>
+            </a:r>
+            <a:r>
+              <a:rPr lang="en-US" dirty="0" smtClean="0"/>
+              <a:t>code</a:t>
+            </a:r>
+          </a:p>
+          <a:p>
+            <a:r>
               <a:rPr lang="en-US" dirty="0"/>
               <a:t>“Wish you could still sue an old exploit? Just wait long enough” – Tim </a:t>
             </a:r>
@@ -7180,70 +8029,6 @@
               <a:t>Medin</a:t>
             </a:r>
             <a:endParaRPr lang="en-US" dirty="0" smtClean="0"/>
-          </a:p>
-          <a:p>
-            <a:r>
-              <a:rPr lang="en-US" dirty="0" err="1" smtClean="0"/>
-              <a:t>DoS</a:t>
-            </a:r>
-            <a:r>
-              <a:rPr lang="en-US" dirty="0" smtClean="0"/>
-              <a:t> by sending SYN with </a:t>
-            </a:r>
-            <a:r>
-              <a:rPr lang="en-US" dirty="0" err="1" smtClean="0"/>
-              <a:t>Src</a:t>
-            </a:r>
-            <a:r>
-              <a:rPr lang="en-US" dirty="0" smtClean="0"/>
-              <a:t> IP = </a:t>
-            </a:r>
-            <a:r>
-              <a:rPr lang="en-US" dirty="0" err="1" smtClean="0"/>
-              <a:t>Dst</a:t>
-            </a:r>
-            <a:r>
-              <a:rPr lang="en-US" dirty="0" smtClean="0"/>
-              <a:t> IP</a:t>
-            </a:r>
-          </a:p>
-          <a:p>
-            <a:r>
-              <a:rPr lang="en-US" dirty="0" smtClean="0"/>
-              <a:t>Affected Windows NT, 95, HP-UX, some printers in 1997.</a:t>
-            </a:r>
-          </a:p>
-          <a:p>
-            <a:pPr lvl="1"/>
-            <a:r>
-              <a:rPr lang="en-US" dirty="0" smtClean="0"/>
-              <a:t>Patch simply commented out problem code</a:t>
-            </a:r>
-          </a:p>
-          <a:p>
-            <a:r>
-              <a:rPr lang="en-US" dirty="0" smtClean="0"/>
-              <a:t>Discovered to affect Windows 98 – 2003 Server in </a:t>
-            </a:r>
-            <a:r>
-              <a:rPr lang="en-US" b="1" u="sng" dirty="0" smtClean="0"/>
-              <a:t>2005</a:t>
-            </a:r>
-          </a:p>
-          <a:p>
-            <a:pPr lvl="1"/>
-            <a:r>
-              <a:rPr lang="en-US" dirty="0" smtClean="0"/>
-              <a:t>New </a:t>
-            </a:r>
-            <a:r>
-              <a:rPr lang="en-US" dirty="0" err="1" smtClean="0"/>
-              <a:t>dev</a:t>
-            </a:r>
-            <a:r>
-              <a:rPr lang="en-US" dirty="0" smtClean="0"/>
-              <a:t> simply uncommented the old code</a:t>
-            </a:r>
           </a:p>
           <a:p>
             <a:endParaRPr lang="en-US" dirty="0" smtClean="0"/>
@@ -7263,6 +8048,13 @@
   <p:clrMapOvr>
     <a:masterClrMapping/>
   </p:clrMapOvr>
+  <p:timing>
+    <p:tnLst>
+      <p:par>
+        <p:cTn id="1" dur="indefinite" restart="never" nodeType="tmRoot"/>
+      </p:par>
+    </p:tnLst>
+  </p:timing>
 </p:sld>
 </file>
 
@@ -7474,7 +8266,19 @@
             <a:pPr lvl="2"/>
             <a:r>
               <a:rPr lang="en-US" dirty="0" smtClean="0"/>
-              <a:t>Organized crime was mostly using to to spread profitable adware</a:t>
+              <a:t>Organized crime was mostly </a:t>
+            </a:r>
+            <a:r>
+              <a:rPr lang="en-US" dirty="0" smtClean="0"/>
+              <a:t>just s</a:t>
+            </a:r>
+            <a:r>
+              <a:rPr lang="en-US" dirty="0" smtClean="0"/>
+              <a:t>preading </a:t>
+            </a:r>
+            <a:r>
+              <a:rPr lang="en-US" dirty="0" smtClean="0"/>
+              <a:t>profitable adware</a:t>
             </a:r>
           </a:p>
           <a:p>
@@ -7761,103 +8565,118 @@
             <p:ph idx="1"/>
           </p:nvPr>
         </p:nvSpPr>
-        <p:spPr/>
+        <p:spPr>
+          <a:xfrm>
+            <a:off x="1371600" y="1828800"/>
+            <a:ext cx="6509208" cy="2337847"/>
+          </a:xfrm>
+        </p:spPr>
         <p:txBody>
           <a:bodyPr>
-            <a:normAutofit/>
+            <a:normAutofit fontScale="92500" lnSpcReduction="10000"/>
           </a:bodyPr>
           <a:lstStyle/>
           <a:p>
             <a:r>
               <a:rPr lang="en-US" dirty="0" smtClean="0"/>
-              <a:t>Follow me on Twitter! @J0hnnyXm4s (With a zero and a four!)</a:t>
-            </a:r>
-          </a:p>
-          <a:p>
-            <a:r>
-              <a:rPr lang="en-US" dirty="0" smtClean="0"/>
-              <a:t>Leave me alone on Facebook! </a:t>
-            </a:r>
-          </a:p>
-          <a:p>
-            <a:r>
-              <a:rPr lang="en-US" dirty="0" smtClean="0"/>
-              <a:t>Check out </a:t>
-            </a:r>
-            <a:r>
-              <a:rPr lang="en-US" smtClean="0"/>
-              <a:t>my </a:t>
-            </a:r>
-            <a:r>
-              <a:rPr lang="en-US" smtClean="0"/>
-              <a:t>YouTube Playlist: </a:t>
-            </a:r>
-            <a:r>
-              <a:rPr lang="en-US" sz="1600" dirty="0">
-                <a:hlinkClick r:id="rId2"/>
-              </a:rPr>
-              <a:t>http://bit.ly/</a:t>
-            </a:r>
-            <a:r>
-              <a:rPr lang="en-US" sz="1600" dirty="0" smtClean="0">
-                <a:hlinkClick r:id="rId2"/>
-              </a:rPr>
-              <a:t>1ZEqaY1</a:t>
-            </a:r>
-            <a:endParaRPr lang="en-US" sz="1600" dirty="0" smtClean="0"/>
-          </a:p>
-          <a:p>
-            <a:r>
-              <a:rPr lang="en-US" sz="1600" dirty="0" smtClean="0"/>
-              <a:t>Slide decks for my talks</a:t>
-            </a:r>
-            <a:r>
-              <a:rPr lang="en-US" sz="1600" dirty="0"/>
-              <a:t>: </a:t>
-            </a:r>
-            <a:r>
-              <a:rPr lang="en-US" sz="1600" dirty="0" smtClean="0">
+              <a:t>Let Me </a:t>
+            </a:r>
+            <a:r>
+              <a:rPr lang="en-US" dirty="0" err="1" smtClean="0"/>
+              <a:t>Pwn</a:t>
+            </a:r>
+            <a:r>
+              <a:rPr lang="en-US" dirty="0" smtClean="0"/>
+              <a:t> You!</a:t>
+            </a:r>
+          </a:p>
+          <a:p>
+            <a:pPr lvl="1"/>
+            <a:r>
+              <a:rPr lang="en-US" dirty="0" smtClean="0">
                 <a:hlinkClick r:id="rId3"/>
               </a:rPr>
-              <a:t>https</a:t>
-            </a:r>
-            <a:r>
-              <a:rPr lang="en-US" sz="1600" dirty="0">
+              <a:t>http://</a:t>
+            </a:r>
+            <a:r>
+              <a:rPr lang="en-US" dirty="0" err="1" smtClean="0">
                 <a:hlinkClick r:id="rId3"/>
               </a:rPr>
+              <a:t>www.redlegg.com</a:t>
+            </a:r>
+            <a:endParaRPr lang="en-US" dirty="0" smtClean="0"/>
+          </a:p>
+          <a:p>
+            <a:r>
+              <a:rPr lang="en-US" dirty="0" smtClean="0"/>
+              <a:t>Hang Out with Me at</a:t>
+            </a:r>
+            <a:r>
+              <a:rPr lang="en-US" dirty="0" smtClean="0"/>
+              <a:t> </a:t>
+            </a:r>
+            <a:r>
+              <a:rPr lang="en-US" dirty="0" err="1" smtClean="0"/>
+              <a:t>BurbSec</a:t>
+            </a:r>
+            <a:r>
+              <a:rPr lang="en-US" dirty="0" smtClean="0"/>
+              <a:t>!</a:t>
+            </a:r>
+          </a:p>
+          <a:p>
+            <a:pPr lvl="1"/>
+            <a:r>
+              <a:rPr lang="en-US" dirty="0" smtClean="0">
+                <a:hlinkClick r:id="rId4"/>
+              </a:rPr>
+              <a:t>http://www.meetup.com/burbsec</a:t>
+            </a:r>
+            <a:endParaRPr lang="en-US" dirty="0" smtClean="0"/>
+          </a:p>
+          <a:p>
+            <a:pPr lvl="1"/>
+            <a:r>
+              <a:rPr lang="en-US" dirty="0" smtClean="0">
+                <a:hlinkClick r:id="rId5"/>
+              </a:rPr>
+              <a:t>http://</a:t>
+            </a:r>
+            <a:r>
+              <a:rPr lang="en-US" dirty="0" err="1" smtClean="0">
+                <a:hlinkClick r:id="rId5"/>
+              </a:rPr>
+              <a:t>burbsec.com</a:t>
+            </a:r>
+            <a:endParaRPr lang="en-US" dirty="0" smtClean="0"/>
+          </a:p>
+          <a:p>
+            <a:r>
+              <a:rPr lang="en-US" sz="1600" dirty="0" smtClean="0"/>
+              <a:t>My Slides &amp; Videos: </a:t>
+            </a:r>
+          </a:p>
+          <a:p>
+            <a:pPr lvl="1"/>
+            <a:r>
+              <a:rPr lang="en-US" sz="1400" dirty="0" smtClean="0">
+                <a:hlinkClick r:id="rId6"/>
+              </a:rPr>
+              <a:t>https</a:t>
+            </a:r>
+            <a:r>
+              <a:rPr lang="en-US" sz="1400" dirty="0">
+                <a:hlinkClick r:id="rId6"/>
+              </a:rPr>
               <a:t>://</a:t>
             </a:r>
             <a:r>
-              <a:rPr lang="en-US" sz="1600" dirty="0" err="1" smtClean="0">
-                <a:hlinkClick r:id="rId3"/>
+              <a:rPr lang="en-US" sz="1400" dirty="0" smtClean="0">
+                <a:hlinkClick r:id="rId6"/>
               </a:rPr>
-              <a:t>github.com</a:t>
-            </a:r>
-            <a:r>
-              <a:rPr lang="en-US" sz="1600" dirty="0" smtClean="0">
-                <a:hlinkClick r:id="rId3"/>
-              </a:rPr>
-              <a:t>/</a:t>
-            </a:r>
-            <a:r>
-              <a:rPr lang="en-US" sz="1600" dirty="0" err="1" smtClean="0">
-                <a:hlinkClick r:id="rId3"/>
-              </a:rPr>
-              <a:t>johnnyxmas</a:t>
-            </a:r>
-            <a:r>
-              <a:rPr lang="en-US" sz="1600" dirty="0" smtClean="0">
-                <a:hlinkClick r:id="rId3"/>
-              </a:rPr>
-              <a:t>/</a:t>
-            </a:r>
-            <a:r>
-              <a:rPr lang="en-US" sz="1600" dirty="0" err="1" smtClean="0">
-                <a:hlinkClick r:id="rId3"/>
-              </a:rPr>
-              <a:t>Talk_Decks</a:t>
-            </a:r>
-            <a:endParaRPr lang="en-US" dirty="0"/>
+              <a:t>github.com/johnnyxmas/Talk_Decks</a:t>
+            </a:r>
+            <a:endParaRPr lang="en-US" sz="1400" dirty="0" smtClean="0"/>
           </a:p>
         </p:txBody>
       </p:sp>
@@ -7871,6 +8690,13 @@
   <p:clrMapOvr>
     <a:masterClrMapping/>
   </p:clrMapOvr>
+  <p:timing>
+    <p:tnLst>
+      <p:par>
+        <p:cTn id="1" dur="indefinite" restart="never" nodeType="tmRoot"/>
+      </p:par>
+    </p:tnLst>
+  </p:timing>
 </p:sld>
 </file>
 
@@ -7909,9 +8735,14 @@
           <a:lstStyle/>
           <a:p>
             <a:r>
-              <a:rPr lang="en-US" dirty="0"/>
-              <a:t>Who is this 1337 HAXOR?</a:t>
-            </a:r>
+              <a:rPr lang="en-US" dirty="0" smtClean="0"/>
+              <a:t>$&gt;</a:t>
+            </a:r>
+            <a:r>
+              <a:rPr lang="en-US" dirty="0" err="1" smtClean="0"/>
+              <a:t>whoami</a:t>
+            </a:r>
+            <a:endParaRPr lang="en-US" dirty="0"/>
           </a:p>
         </p:txBody>
       </p:sp>
@@ -7925,81 +8756,161 @@
             <p:ph idx="1"/>
           </p:nvPr>
         </p:nvSpPr>
-        <p:spPr/>
+        <p:spPr>
+          <a:xfrm>
+            <a:off x="1371600" y="1594884"/>
+            <a:ext cx="6400800" cy="2583712"/>
+          </a:xfrm>
+        </p:spPr>
         <p:txBody>
           <a:bodyPr>
-            <a:normAutofit fontScale="92500" lnSpcReduction="10000"/>
+            <a:normAutofit lnSpcReduction="10000"/>
           </a:bodyPr>
           <a:lstStyle/>
           <a:p>
             <a:r>
               <a:rPr lang="en-US" dirty="0" smtClean="0"/>
-              <a:t>#REDTEAMGO</a:t>
-            </a:r>
+              <a:t>Notable Achievements</a:t>
+            </a:r>
+            <a:endParaRPr lang="en-US" dirty="0" smtClean="0"/>
           </a:p>
           <a:p>
             <a:pPr lvl="1"/>
             <a:r>
               <a:rPr lang="en-US" dirty="0" smtClean="0"/>
-              <a:t>GIAC Penetration Tester</a:t>
-            </a:r>
+              <a:t>Speaker &amp; Trainer at 25 conferences in 4 countries for the past 18 months.</a:t>
+            </a:r>
+            <a:endParaRPr lang="en-US" dirty="0" smtClean="0"/>
           </a:p>
           <a:p>
             <a:pPr lvl="1"/>
             <a:r>
               <a:rPr lang="en-US" dirty="0" smtClean="0"/>
-              <a:t>Penetration Tester for RedLegg International</a:t>
-            </a:r>
-          </a:p>
-          <a:p>
-            <a:pPr lvl="2"/>
-            <a:r>
-              <a:rPr lang="en-US" dirty="0" smtClean="0"/>
-              <a:t>Top-to-bottom, context &amp; threat-based security assessments</a:t>
-            </a:r>
-          </a:p>
-          <a:p>
-            <a:pPr lvl="2"/>
-            <a:r>
-              <a:rPr lang="en-US" dirty="0" smtClean="0"/>
-              <a:t>VERY large, global clients, plus Federal, nonprofit, etc.</a:t>
-            </a:r>
-          </a:p>
-          <a:p>
-            <a:pPr lvl="2"/>
-            <a:r>
-              <a:rPr lang="en-US" dirty="0" smtClean="0"/>
-              <a:t>Seriously vicious phishing campaigns</a:t>
-            </a:r>
+              <a:t>Primary on the 3D Printed TSA Keys Leak</a:t>
+            </a:r>
+          </a:p>
+          <a:p>
+            <a:pPr lvl="1"/>
+            <a:endParaRPr lang="en-US" dirty="0" smtClean="0"/>
+          </a:p>
+          <a:p>
+            <a:pPr lvl="1"/>
             <a:endParaRPr lang="en-US" dirty="0"/>
           </a:p>
           <a:p>
-            <a:pPr lvl="2"/>
-            <a:r>
-              <a:rPr lang="en-US" dirty="0" smtClean="0"/>
-              <a:t>I rob banks for a living</a:t>
-            </a:r>
-          </a:p>
-          <a:p>
-            <a:r>
-              <a:rPr lang="en-US" dirty="0" smtClean="0"/>
-              <a:t>Speaking at </a:t>
-            </a:r>
-            <a:r>
-              <a:rPr lang="en-US" dirty="0" smtClean="0"/>
-              <a:t>13 </a:t>
-            </a:r>
-            <a:r>
-              <a:rPr lang="en-US" dirty="0" smtClean="0"/>
-              <a:t>conferences this year in 3 countries</a:t>
-            </a:r>
-          </a:p>
-        </p:txBody>
-      </p:sp>
+            <a:pPr lvl="1"/>
+            <a:endParaRPr lang="en-US" dirty="0" smtClean="0"/>
+          </a:p>
+          <a:p>
+            <a:pPr lvl="1"/>
+            <a:endParaRPr lang="en-US" dirty="0" smtClean="0"/>
+          </a:p>
+          <a:p>
+            <a:pPr lvl="1"/>
+            <a:r>
+              <a:rPr lang="en-US" dirty="0" smtClean="0">
+                <a:hlinkClick r:id="rId3"/>
+              </a:rPr>
+              <a:t>Time Magazine Man of the Year 2006</a:t>
+            </a:r>
+            <a:endParaRPr lang="en-US" dirty="0" smtClean="0"/>
+          </a:p>
+        </p:txBody>
+      </p:sp>
+      <p:pic>
+        <p:nvPicPr>
+          <p:cNvPr id="4" name="Picture 3"/>
+          <p:cNvPicPr>
+            <a:picLocks noChangeAspect="1"/>
+          </p:cNvPicPr>
+          <p:nvPr/>
+        </p:nvPicPr>
+        <p:blipFill>
+          <a:blip r:embed="rId4">
+            <a:extLst>
+              <a:ext uri="{28A0092B-C50C-407E-A947-70E740481C1C}">
+                <a14:useLocalDpi xmlns:a14="http://schemas.microsoft.com/office/drawing/2010/main" val="0"/>
+              </a:ext>
+            </a:extLst>
+          </a:blip>
+          <a:stretch>
+            <a:fillRect/>
+          </a:stretch>
+        </p:blipFill>
+        <p:spPr>
+          <a:xfrm>
+            <a:off x="2323707" y="2886740"/>
+            <a:ext cx="4496586" cy="813268"/>
+          </a:xfrm>
+          <a:prstGeom prst="rect">
+            <a:avLst/>
+          </a:prstGeom>
+        </p:spPr>
+      </p:pic>
+      <p:pic>
+        <p:nvPicPr>
+          <p:cNvPr id="5" name="Picture 4"/>
+          <p:cNvPicPr>
+            <a:picLocks noChangeAspect="1"/>
+          </p:cNvPicPr>
+          <p:nvPr/>
+        </p:nvPicPr>
+        <p:blipFill>
+          <a:blip r:embed="rId5">
+            <a:extLst>
+              <a:ext uri="{28A0092B-C50C-407E-A947-70E740481C1C}">
+                <a14:useLocalDpi xmlns:a14="http://schemas.microsoft.com/office/drawing/2010/main" val="0"/>
+              </a:ext>
+            </a:extLst>
+          </a:blip>
+          <a:stretch>
+            <a:fillRect/>
+          </a:stretch>
+        </p:blipFill>
+        <p:spPr>
+          <a:xfrm>
+            <a:off x="6450159" y="3014024"/>
+            <a:ext cx="1920843" cy="552828"/>
+          </a:xfrm>
+          <a:prstGeom prst="rect">
+            <a:avLst/>
+          </a:prstGeom>
+        </p:spPr>
+      </p:pic>
+      <p:pic>
+        <p:nvPicPr>
+          <p:cNvPr id="6" name="Picture 5"/>
+          <p:cNvPicPr>
+            <a:picLocks noChangeAspect="1"/>
+          </p:cNvPicPr>
+          <p:nvPr/>
+        </p:nvPicPr>
+        <p:blipFill>
+          <a:blip r:embed="rId6">
+            <a:extLst>
+              <a:ext uri="{28A0092B-C50C-407E-A947-70E740481C1C}">
+                <a14:useLocalDpi xmlns:a14="http://schemas.microsoft.com/office/drawing/2010/main" val="0"/>
+              </a:ext>
+            </a:extLst>
+          </a:blip>
+          <a:stretch>
+            <a:fillRect/>
+          </a:stretch>
+        </p:blipFill>
+        <p:spPr>
+          <a:xfrm>
+            <a:off x="772998" y="3014024"/>
+            <a:ext cx="1713604" cy="555764"/>
+          </a:xfrm>
+          <a:prstGeom prst="rect">
+            <a:avLst/>
+          </a:prstGeom>
+        </p:spPr>
+      </p:pic>
     </p:spTree>
     <p:extLst>
       <p:ext uri="{BB962C8B-B14F-4D97-AF65-F5344CB8AC3E}">
-        <p14:creationId xmlns:p14="http://schemas.microsoft.com/office/powerpoint/2010/main" val="380244354"/>
+        <p14:creationId xmlns:p14="http://schemas.microsoft.com/office/powerpoint/2010/main" val="853004782"/>
       </p:ext>
     </p:extLst>
   </p:cSld>
@@ -8077,38 +8988,27 @@
           <a:p>
             <a:r>
               <a:rPr lang="en-US" sz="2400" dirty="0" smtClean="0"/>
-              <a:t> I </a:t>
+              <a:t> </a:t>
             </a:r>
             <a:r>
               <a:rPr lang="en-US" sz="2400" dirty="0" smtClean="0"/>
-              <a:t>don’t think we need to discuss this</a:t>
-            </a:r>
-            <a:r>
-              <a:rPr lang="en-US" sz="2400" dirty="0" smtClean="0"/>
-              <a:t>.</a:t>
+              <a:t>Two primary aspects:</a:t>
             </a:r>
           </a:p>
           <a:p>
             <a:pPr lvl="1"/>
             <a:r>
-              <a:rPr lang="en-US" sz="2200" dirty="0" smtClean="0"/>
-              <a:t>Then why did I make a slide?</a:t>
+              <a:rPr lang="en-US" sz="2000" dirty="0" smtClean="0"/>
+              <a:t>The uncovering and dissemination of previously unknown knowledge</a:t>
             </a:r>
           </a:p>
           <a:p>
             <a:pPr lvl="1"/>
             <a:r>
-              <a:rPr lang="en-US" sz="2200" dirty="0" smtClean="0"/>
-              <a:t>I don’t know. </a:t>
-            </a:r>
-          </a:p>
-          <a:p>
-            <a:pPr lvl="1"/>
-            <a:r>
-              <a:rPr lang="en-US" sz="2200" dirty="0" smtClean="0"/>
-              <a:t>This is awkward. Say something. </a:t>
-            </a:r>
-            <a:endParaRPr lang="en-US" sz="2200" dirty="0"/>
+              <a:rPr lang="en-US" sz="2000" dirty="0" smtClean="0"/>
+              <a:t>The use or exploitation of that knowledge to gain new or additional functionality</a:t>
+            </a:r>
+            <a:endParaRPr lang="en-US" sz="2000" dirty="0"/>
           </a:p>
         </p:txBody>
       </p:sp>
@@ -8122,6 +9022,13 @@
   <p:clrMapOvr>
     <a:masterClrMapping/>
   </p:clrMapOvr>
+  <p:timing>
+    <p:tnLst>
+      <p:par>
+        <p:cTn id="1" dur="indefinite" restart="never" nodeType="tmRoot"/>
+      </p:par>
+    </p:tnLst>
+  </p:timing>
 </p:sld>
 </file>
 
@@ -8178,7 +9085,7 @@
           </p:nvPr>
         </p:nvPicPr>
         <p:blipFill>
-          <a:blip r:embed="rId2">
+          <a:blip r:embed="rId3">
             <a:extLst>
               <a:ext uri="{28A0092B-C50C-407E-A947-70E740481C1C}">
                 <a14:useLocalDpi xmlns:a14="http://schemas.microsoft.com/office/drawing/2010/main" val="0"/>
@@ -8192,7 +9099,7 @@
         </p:blipFill>
         <p:spPr>
           <a:xfrm>
-            <a:off x="1371600" y="1828800"/>
+            <a:off x="1362173" y="1828800"/>
             <a:ext cx="6400800" cy="1865313"/>
           </a:xfrm>
         </p:spPr>
@@ -8221,31 +9128,31 @@
           <a:p>
             <a:r>
               <a:rPr lang="en-US" sz="1200" dirty="0" smtClean="0">
-                <a:hlinkClick r:id="rId3" invalidUrl="file://localhost\Rabbit Hole\ https\::en.wikipedia.org:wiki:Max_Headroom_broadcast_signal_intrusion" action="ppaction://hlinkfile"/>
+                <a:hlinkClick r:id="rId4" invalidUrl="file://localhost\Rabbit Hole\ https\::en.wikipedia.org:wiki:Max_Headroom_broadcast_signal_intrusion" action="ppaction://hlinkfile"/>
               </a:rPr>
               <a:t>Rabbit Hole: https</a:t>
             </a:r>
             <a:r>
               <a:rPr lang="en-US" sz="1200" dirty="0">
-                <a:hlinkClick r:id="rId4" invalidUrl="file://localhost\Rabbit Hole\ https\::en.wikipedia.org:wiki:Max_Headroom_broadcast_signal_intrusion" action="ppaction://hlinkfile"/>
+                <a:hlinkClick r:id="rId5" invalidUrl="file://localhost\Rabbit Hole\ https\::en.wikipedia.org:wiki:Max_Headroom_broadcast_signal_intrusion" action="ppaction://hlinkfile"/>
               </a:rPr>
               <a:t>://</a:t>
             </a:r>
             <a:r>
               <a:rPr lang="en-US" sz="1200" dirty="0" err="1">
-                <a:hlinkClick r:id="rId5" invalidUrl="file://localhost\Rabbit Hole\ https\::en.wikipedia.org:wiki:Max_Headroom_broadcast_signal_intrusion" action="ppaction://hlinkfile"/>
+                <a:hlinkClick r:id="rId6" invalidUrl="file://localhost\Rabbit Hole\ https\::en.wikipedia.org:wiki:Max_Headroom_broadcast_signal_intrusion" action="ppaction://hlinkfile"/>
               </a:rPr>
               <a:t>en.wikipedia.org</a:t>
             </a:r>
             <a:r>
               <a:rPr lang="en-US" sz="1200" dirty="0">
-                <a:hlinkClick r:id="rId6" invalidUrl="file://localhost\Rabbit Hole\ https\::en.wikipedia.org:wiki:Max_Headroom_broadcast_signal_intrusion" action="ppaction://hlinkfile"/>
+                <a:hlinkClick r:id="rId7" invalidUrl="file://localhost\Rabbit Hole\ https\::en.wikipedia.org:wiki:Max_Headroom_broadcast_signal_intrusion" action="ppaction://hlinkfile"/>
               </a:rPr>
               <a:t>/wiki/</a:t>
             </a:r>
             <a:r>
               <a:rPr lang="en-US" sz="1200" dirty="0" err="1">
-                <a:hlinkClick r:id="rId7" invalidUrl="file://localhost\Rabbit Hole\ https\::en.wikipedia.org:wiki:Max_Headroom_broadcast_signal_intrusion" action="ppaction://hlinkfile"/>
+                <a:hlinkClick r:id="rId8" invalidUrl="file://localhost\Rabbit Hole\ https\::en.wikipedia.org:wiki:Max_Headroom_broadcast_signal_intrusion" action="ppaction://hlinkfile"/>
               </a:rPr>
               <a:t>Max_Headroom_broadcast_signal_intrusion</a:t>
             </a:r>
@@ -8328,7 +9235,7 @@
         <p:spPr/>
         <p:txBody>
           <a:bodyPr>
-            <a:normAutofit fontScale="85000" lnSpcReduction="20000"/>
+            <a:normAutofit/>
           </a:bodyPr>
           <a:lstStyle/>
           <a:p>
@@ -8341,14 +9248,35 @@
             <a:pPr lvl="1"/>
             <a:r>
               <a:rPr lang="en-US" dirty="0" smtClean="0"/>
-              <a:t>That meant NO PHONING HOME</a:t>
-            </a:r>
+              <a:t>That meant NO PHONING </a:t>
+            </a:r>
+            <a:r>
+              <a:rPr lang="en-US" dirty="0" smtClean="0"/>
+              <a:t>HOME. Now 2-way </a:t>
+            </a:r>
+            <a:r>
+              <a:rPr lang="en-US" dirty="0" err="1" smtClean="0"/>
+              <a:t>comms</a:t>
+            </a:r>
+            <a:r>
+              <a:rPr lang="en-US" dirty="0" smtClean="0"/>
+              <a:t>.</a:t>
+            </a:r>
+            <a:endParaRPr lang="en-US" dirty="0" smtClean="0"/>
           </a:p>
           <a:p>
             <a:pPr lvl="1"/>
             <a:r>
-              <a:rPr lang="en-US" dirty="0" smtClean="0"/>
-              <a:t>Pirates were not remotely detectable or easily targeted</a:t>
+              <a:rPr lang="en-US" dirty="0"/>
+              <a:t>P</a:t>
+            </a:r>
+            <a:r>
+              <a:rPr lang="en-US" dirty="0" smtClean="0"/>
+              <a:t>irates </a:t>
+            </a:r>
+            <a:r>
+              <a:rPr lang="en-US" dirty="0" smtClean="0"/>
+              <a:t>were not remotely detectable or easily targeted</a:t>
             </a:r>
           </a:p>
           <a:p>
@@ -8361,7 +9289,19 @@
             <a:pPr lvl="1"/>
             <a:r>
               <a:rPr lang="en-US" dirty="0"/>
-              <a:t>Want a signal? Just tap it at the </a:t>
+              <a:t>Want a signal? Just </a:t>
+            </a:r>
+            <a:r>
+              <a:rPr lang="en-US" dirty="0" smtClean="0"/>
+              <a:t>splice in</a:t>
+            </a:r>
+            <a:r>
+              <a:rPr lang="en-US" dirty="0" smtClean="0"/>
+              <a:t> </a:t>
+            </a:r>
+            <a:r>
+              <a:rPr lang="en-US" dirty="0"/>
+              <a:t>at the </a:t>
             </a:r>
             <a:r>
               <a:rPr lang="en-US" dirty="0" smtClean="0"/>
@@ -8372,34 +9312,13 @@
             <a:pPr lvl="1"/>
             <a:r>
               <a:rPr lang="en-US" dirty="0" smtClean="0"/>
-              <a:t>Targeting had to be done via broadcasts (just like LAN broadcasts)</a:t>
-            </a:r>
-          </a:p>
-          <a:p>
-            <a:pPr lvl="2"/>
-            <a:r>
-              <a:rPr lang="en-US" dirty="0" smtClean="0"/>
-              <a:t>Pay-Per-View</a:t>
-            </a:r>
-          </a:p>
-          <a:p>
-            <a:pPr lvl="2"/>
-            <a:r>
-              <a:rPr lang="en-US" dirty="0" smtClean="0"/>
-              <a:t>Premium channel subscriptions</a:t>
-            </a:r>
-          </a:p>
-          <a:p>
-            <a:pPr lvl="2"/>
-            <a:r>
-              <a:rPr lang="en-US" dirty="0" err="1" smtClean="0"/>
-              <a:t>Deauthenticating</a:t>
-            </a:r>
-            <a:r>
-              <a:rPr lang="en-US" dirty="0" smtClean="0"/>
-              <a:t> stolen boxes</a:t>
-            </a:r>
-            <a:endParaRPr lang="en-US" dirty="0"/>
+              <a:t>Targeting had to be done via broadcasts (just like LAN broadcasts</a:t>
+            </a:r>
+            <a:r>
+              <a:rPr lang="en-US" dirty="0" smtClean="0"/>
+              <a:t>)</a:t>
+            </a:r>
+            <a:endParaRPr lang="en-US" dirty="0" smtClean="0"/>
           </a:p>
         </p:txBody>
       </p:sp>
@@ -8570,14 +9489,19 @@
         <p:spPr/>
         <p:txBody>
           <a:bodyPr>
-            <a:normAutofit fontScale="92500" lnSpcReduction="20000"/>
+            <a:normAutofit fontScale="85000" lnSpcReduction="20000"/>
           </a:bodyPr>
           <a:lstStyle/>
           <a:p>
             <a:r>
               <a:rPr lang="en-US" dirty="0" smtClean="0"/>
-              <a:t>Premium services were “scrambled”</a:t>
-            </a:r>
+              <a:t>Premium services were “scrambled</a:t>
+            </a:r>
+            <a:r>
+              <a:rPr lang="en-US" dirty="0" smtClean="0"/>
+              <a:t>” on the wire, and your box descrambled</a:t>
+            </a:r>
+            <a:endParaRPr lang="en-US" dirty="0" smtClean="0"/>
           </a:p>
           <a:p>
             <a:pPr lvl="1"/>
@@ -8590,39 +9514,73 @@
             <a:pPr lvl="1"/>
             <a:r>
               <a:rPr lang="en-US" dirty="0" smtClean="0"/>
-              <a:t>Didn’t actually descramble, just told the main box to do so</a:t>
-            </a:r>
+              <a:t>Didn’t actually descramble, just told the main box </a:t>
+            </a:r>
+            <a:r>
+              <a:rPr lang="en-US" dirty="0" smtClean="0"/>
+              <a:t>to do so</a:t>
+            </a:r>
+            <a:endParaRPr lang="en-US" dirty="0" smtClean="0"/>
           </a:p>
           <a:p>
             <a:pPr lvl="1"/>
             <a:r>
               <a:rPr lang="en-US" dirty="0" smtClean="0"/>
-              <a:t>“Bullet Protectors” absorbed the “stop descramble” signal</a:t>
+              <a:t>“Bullet Protectors” absorbed the “</a:t>
+            </a:r>
+            <a:r>
+              <a:rPr lang="en-US" dirty="0" smtClean="0"/>
+              <a:t>start descramble</a:t>
+            </a:r>
+            <a:r>
+              <a:rPr lang="en-US" dirty="0" smtClean="0"/>
+              <a:t>” </a:t>
+            </a:r>
+            <a:r>
+              <a:rPr lang="en-US" dirty="0" smtClean="0"/>
+              <a:t>signal</a:t>
+            </a:r>
+            <a:endParaRPr lang="en-US" dirty="0"/>
+          </a:p>
+          <a:p>
+            <a:r>
+              <a:rPr lang="en-US" dirty="0" smtClean="0"/>
+              <a:t>Tracing manufacturers of the “descramblers” was difficult</a:t>
             </a:r>
           </a:p>
           <a:p>
             <a:pPr lvl="1"/>
-            <a:endParaRPr lang="en-US" dirty="0"/>
-          </a:p>
-          <a:p>
-            <a:r>
-              <a:rPr lang="en-US" dirty="0" smtClean="0"/>
-              <a:t>Tracing manufacturers of the “descramblers” was difficult</a:t>
+            <a:r>
+              <a:rPr lang="en-US" dirty="0" smtClean="0"/>
+              <a:t>24/7 Descramblers and the Mike </a:t>
+            </a:r>
+            <a:r>
+              <a:rPr lang="en-US" dirty="0" smtClean="0"/>
+              <a:t>Tyson hat </a:t>
+            </a:r>
+            <a:r>
+              <a:rPr lang="en-US" dirty="0" smtClean="0"/>
+              <a:t>offer</a:t>
+            </a:r>
+            <a:endParaRPr lang="en-US" dirty="0" smtClean="0"/>
+          </a:p>
+          <a:p>
+            <a:r>
+              <a:rPr lang="en-US" dirty="0" smtClean="0"/>
+              <a:t>Very easy to </a:t>
+            </a:r>
+            <a:r>
+              <a:rPr lang="en-US" dirty="0" smtClean="0"/>
+              <a:t>build </a:t>
             </a:r>
           </a:p>
           <a:p>
             <a:pPr lvl="1"/>
             <a:r>
               <a:rPr lang="en-US" dirty="0" smtClean="0"/>
-              <a:t>Mike Tyson hat offer</a:t>
-            </a:r>
-          </a:p>
-          <a:p>
-            <a:pPr lvl="1"/>
-            <a:r>
-              <a:rPr lang="en-US" dirty="0" smtClean="0"/>
-              <a:t>Very easy to build –how would you know, you ask?</a:t>
-            </a:r>
+              <a:t>If you knew where to get the info. . . . . . . . . </a:t>
+            </a:r>
+            <a:endParaRPr lang="en-US" dirty="0" smtClean="0"/>
           </a:p>
         </p:txBody>
       </p:sp>
@@ -8699,7 +9657,7 @@
           </p:nvPr>
         </p:nvPicPr>
         <p:blipFill>
-          <a:blip r:embed="rId2">
+          <a:blip r:embed="rId3">
             <a:extLst>
               <a:ext uri="{28A0092B-C50C-407E-A947-70E740481C1C}">
                 <a14:useLocalDpi xmlns:a14="http://schemas.microsoft.com/office/drawing/2010/main" val="0"/>

</xml_diff>